<commit_message>
New logo versions, based on PPT
</commit_message>
<xml_diff>
--- a/logo.pptx
+++ b/logo.pptx
@@ -290,7 +290,7 @@
           <a:p>
             <a:fld id="{062DDCC8-E8A0-4754-BEF6-F5DF65A47B23}" type="datetimeFigureOut">
               <a:rPr lang="en-US" smtClean="0"/>
-              <a:t>2014-07-31</a:t>
+              <a:t>2014-09-13</a:t>
             </a:fld>
             <a:endParaRPr lang="en-US"/>
           </a:p>
@@ -460,7 +460,7 @@
           <a:p>
             <a:fld id="{062DDCC8-E8A0-4754-BEF6-F5DF65A47B23}" type="datetimeFigureOut">
               <a:rPr lang="en-US" smtClean="0"/>
-              <a:t>2014-07-31</a:t>
+              <a:t>2014-09-13</a:t>
             </a:fld>
             <a:endParaRPr lang="en-US"/>
           </a:p>
@@ -640,7 +640,7 @@
           <a:p>
             <a:fld id="{062DDCC8-E8A0-4754-BEF6-F5DF65A47B23}" type="datetimeFigureOut">
               <a:rPr lang="en-US" smtClean="0"/>
-              <a:t>2014-07-31</a:t>
+              <a:t>2014-09-13</a:t>
             </a:fld>
             <a:endParaRPr lang="en-US"/>
           </a:p>
@@ -810,7 +810,7 @@
           <a:p>
             <a:fld id="{062DDCC8-E8A0-4754-BEF6-F5DF65A47B23}" type="datetimeFigureOut">
               <a:rPr lang="en-US" smtClean="0"/>
-              <a:t>2014-07-31</a:t>
+              <a:t>2014-09-13</a:t>
             </a:fld>
             <a:endParaRPr lang="en-US"/>
           </a:p>
@@ -1056,7 +1056,7 @@
           <a:p>
             <a:fld id="{062DDCC8-E8A0-4754-BEF6-F5DF65A47B23}" type="datetimeFigureOut">
               <a:rPr lang="en-US" smtClean="0"/>
-              <a:t>2014-07-31</a:t>
+              <a:t>2014-09-13</a:t>
             </a:fld>
             <a:endParaRPr lang="en-US"/>
           </a:p>
@@ -1344,7 +1344,7 @@
           <a:p>
             <a:fld id="{062DDCC8-E8A0-4754-BEF6-F5DF65A47B23}" type="datetimeFigureOut">
               <a:rPr lang="en-US" smtClean="0"/>
-              <a:t>2014-07-31</a:t>
+              <a:t>2014-09-13</a:t>
             </a:fld>
             <a:endParaRPr lang="en-US"/>
           </a:p>
@@ -1766,7 +1766,7 @@
           <a:p>
             <a:fld id="{062DDCC8-E8A0-4754-BEF6-F5DF65A47B23}" type="datetimeFigureOut">
               <a:rPr lang="en-US" smtClean="0"/>
-              <a:t>2014-07-31</a:t>
+              <a:t>2014-09-13</a:t>
             </a:fld>
             <a:endParaRPr lang="en-US"/>
           </a:p>
@@ -1884,7 +1884,7 @@
           <a:p>
             <a:fld id="{062DDCC8-E8A0-4754-BEF6-F5DF65A47B23}" type="datetimeFigureOut">
               <a:rPr lang="en-US" smtClean="0"/>
-              <a:t>2014-07-31</a:t>
+              <a:t>2014-09-13</a:t>
             </a:fld>
             <a:endParaRPr lang="en-US"/>
           </a:p>
@@ -1964,115 +1964,20 @@
       </p:grpSpPr>
       <p:sp>
         <p:nvSpPr>
-          <p:cNvPr id="5" name="Rounded Rectangle 4"/>
+          <p:cNvPr id="2" name="Rectangle 1"/>
           <p:cNvSpPr/>
           <p:nvPr userDrawn="1"/>
         </p:nvSpPr>
         <p:spPr>
           <a:xfrm>
-            <a:off x="228600" y="228600"/>
-            <a:ext cx="8686800" cy="8686800"/>
-          </a:xfrm>
-          <a:prstGeom prst="roundRect">
-            <a:avLst/>
-          </a:prstGeom>
-          <a:solidFill>
-            <a:srgbClr val="92D050"/>
-          </a:solidFill>
-          <a:ln w="381000">
-            <a:solidFill>
-              <a:schemeClr val="bg2">
-                <a:lumMod val="50000"/>
-              </a:schemeClr>
-            </a:solidFill>
-          </a:ln>
-        </p:spPr>
-        <p:style>
-          <a:lnRef idx="2">
-            <a:schemeClr val="accent1">
-              <a:shade val="50000"/>
-            </a:schemeClr>
-          </a:lnRef>
-          <a:fillRef idx="1">
-            <a:schemeClr val="accent1"/>
-          </a:fillRef>
-          <a:effectRef idx="0">
-            <a:schemeClr val="accent1"/>
-          </a:effectRef>
-          <a:fontRef idx="minor">
-            <a:schemeClr val="lt1"/>
-          </a:fontRef>
-        </p:style>
-        <p:txBody>
-          <a:bodyPr rtlCol="0" anchor="ctr"/>
-          <a:lstStyle/>
-          <a:p>
-            <a:pPr algn="ctr"/>
-            <a:endParaRPr lang="en-US" sz="80000" dirty="0">
-              <a:latin typeface="Aharoni" panose="02010803020104030203" pitchFamily="2" charset="-79"/>
-              <a:cs typeface="Aharoni" panose="02010803020104030203" pitchFamily="2" charset="-79"/>
-            </a:endParaRPr>
-          </a:p>
-        </p:txBody>
-      </p:sp>
-      <p:sp>
-        <p:nvSpPr>
-          <p:cNvPr id="6" name="TextBox 5"/>
-          <p:cNvSpPr txBox="1"/>
-          <p:nvPr userDrawn="1"/>
-        </p:nvSpPr>
-        <p:spPr>
-          <a:xfrm>
-            <a:off x="2673956" y="-334030"/>
-            <a:ext cx="4336444" cy="9325630"/>
-          </a:xfrm>
-          <a:prstGeom prst="rect">
-            <a:avLst/>
-          </a:prstGeom>
-          <a:noFill/>
-        </p:spPr>
-        <p:txBody>
-          <a:bodyPr wrap="none" rtlCol="0">
-            <a:spAutoFit/>
-          </a:bodyPr>
-          <a:lstStyle/>
-          <a:p>
-            <a:r>
-              <a:rPr lang="en-US" sz="60000" dirty="0" smtClean="0">
-                <a:solidFill>
-                  <a:schemeClr val="bg1"/>
-                </a:solidFill>
-                <a:latin typeface="Lucida Handwriting" panose="03010101010101010101" pitchFamily="66" charset="0"/>
-                <a:cs typeface="Aharoni" panose="02010803020104030203" pitchFamily="2" charset="-79"/>
-              </a:rPr>
-              <a:t>J</a:t>
-            </a:r>
-            <a:endParaRPr lang="en-US" sz="60000" dirty="0">
-              <a:solidFill>
-                <a:schemeClr val="bg1"/>
-              </a:solidFill>
-              <a:latin typeface="Lucida Handwriting" panose="03010101010101010101" pitchFamily="66" charset="0"/>
-              <a:cs typeface="Aharoni" panose="02010803020104030203" pitchFamily="2" charset="-79"/>
-            </a:endParaRPr>
-          </a:p>
-        </p:txBody>
-      </p:sp>
-      <p:sp>
-        <p:nvSpPr>
-          <p:cNvPr id="7" name="Rectangle 6"/>
-          <p:cNvSpPr/>
-          <p:nvPr userDrawn="1"/>
-        </p:nvSpPr>
-        <p:spPr>
-          <a:xfrm>
-            <a:off x="4267200" y="685800"/>
-            <a:ext cx="3733800" cy="1339055"/>
+            <a:off x="-228600" y="-457200"/>
+            <a:ext cx="9372600" cy="9677400"/>
           </a:xfrm>
           <a:prstGeom prst="rect">
             <a:avLst/>
           </a:prstGeom>
           <a:solidFill>
-            <a:srgbClr val="92D050"/>
+            <a:srgbClr val="0000FF"/>
           </a:solidFill>
           <a:ln>
             <a:noFill/>
@@ -2103,91 +2008,6 @@
           </a:p>
         </p:txBody>
       </p:sp>
-      <p:grpSp>
-        <p:nvGrpSpPr>
-          <p:cNvPr id="8" name="Group 7"/>
-          <p:cNvGrpSpPr/>
-          <p:nvPr userDrawn="1"/>
-        </p:nvGrpSpPr>
-        <p:grpSpPr>
-          <a:xfrm rot="480000">
-            <a:off x="4422049" y="1201830"/>
-            <a:ext cx="3124200" cy="1828800"/>
-            <a:chOff x="9448800" y="457200"/>
-            <a:chExt cx="3124200" cy="1828800"/>
-          </a:xfrm>
-        </p:grpSpPr>
-        <p:cxnSp>
-          <p:nvCxnSpPr>
-            <p:cNvPr id="9" name="Straight Connector 8"/>
-            <p:cNvCxnSpPr/>
-            <p:nvPr/>
-          </p:nvCxnSpPr>
-          <p:spPr>
-            <a:xfrm flipV="1">
-              <a:off x="9448800" y="457200"/>
-              <a:ext cx="1828800" cy="1828800"/>
-            </a:xfrm>
-            <a:prstGeom prst="line">
-              <a:avLst/>
-            </a:prstGeom>
-            <a:ln w="762000">
-              <a:solidFill>
-                <a:schemeClr val="bg1"/>
-              </a:solidFill>
-            </a:ln>
-          </p:spPr>
-          <p:style>
-            <a:lnRef idx="1">
-              <a:schemeClr val="accent1"/>
-            </a:lnRef>
-            <a:fillRef idx="0">
-              <a:schemeClr val="accent1"/>
-            </a:fillRef>
-            <a:effectRef idx="0">
-              <a:schemeClr val="accent1"/>
-            </a:effectRef>
-            <a:fontRef idx="minor">
-              <a:schemeClr val="tx1"/>
-            </a:fontRef>
-          </p:style>
-        </p:cxnSp>
-        <p:cxnSp>
-          <p:nvCxnSpPr>
-            <p:cNvPr id="10" name="Straight Connector 9"/>
-            <p:cNvCxnSpPr/>
-            <p:nvPr/>
-          </p:nvCxnSpPr>
-          <p:spPr>
-            <a:xfrm flipH="1" flipV="1">
-              <a:off x="10744200" y="457200"/>
-              <a:ext cx="1828800" cy="1828800"/>
-            </a:xfrm>
-            <a:prstGeom prst="line">
-              <a:avLst/>
-            </a:prstGeom>
-            <a:ln w="762000">
-              <a:solidFill>
-                <a:schemeClr val="bg1"/>
-              </a:solidFill>
-            </a:ln>
-          </p:spPr>
-          <p:style>
-            <a:lnRef idx="1">
-              <a:schemeClr val="accent1"/>
-            </a:lnRef>
-            <a:fillRef idx="0">
-              <a:schemeClr val="accent1"/>
-            </a:fillRef>
-            <a:effectRef idx="0">
-              <a:schemeClr val="accent1"/>
-            </a:effectRef>
-            <a:fontRef idx="minor">
-              <a:schemeClr val="tx1"/>
-            </a:fontRef>
-          </p:style>
-        </p:cxnSp>
-      </p:grpSp>
     </p:spTree>
     <p:extLst>
       <p:ext uri="{BB962C8B-B14F-4D97-AF65-F5344CB8AC3E}">
@@ -2424,7 +2244,7 @@
           <a:p>
             <a:fld id="{062DDCC8-E8A0-4754-BEF6-F5DF65A47B23}" type="datetimeFigureOut">
               <a:rPr lang="en-US" smtClean="0"/>
-              <a:t>2014-07-31</a:t>
+              <a:t>2014-09-13</a:t>
             </a:fld>
             <a:endParaRPr lang="en-US"/>
           </a:p>
@@ -2482,6 +2302,13 @@
   <p:clrMapOvr>
     <a:masterClrMapping/>
   </p:clrMapOvr>
+  <p:timing>
+    <p:tnLst>
+      <p:par>
+        <p:cTn id="1" dur="indefinite" restart="never" nodeType="tmRoot"/>
+      </p:par>
+    </p:tnLst>
+  </p:timing>
 </p:sldLayout>
 </file>
 
@@ -2677,7 +2504,7 @@
           <a:p>
             <a:fld id="{062DDCC8-E8A0-4754-BEF6-F5DF65A47B23}" type="datetimeFigureOut">
               <a:rPr lang="en-US" smtClean="0"/>
-              <a:t>2014-07-31</a:t>
+              <a:t>2014-09-13</a:t>
             </a:fld>
             <a:endParaRPr lang="en-US"/>
           </a:p>
@@ -2735,6 +2562,13 @@
   <p:clrMapOvr>
     <a:masterClrMapping/>
   </p:clrMapOvr>
+  <p:timing>
+    <p:tnLst>
+      <p:par>
+        <p:cTn id="1" dur="indefinite" restart="never" nodeType="tmRoot"/>
+      </p:par>
+    </p:tnLst>
+  </p:timing>
 </p:sldLayout>
 </file>
 
@@ -2895,7 +2729,7 @@
           <a:p>
             <a:fld id="{062DDCC8-E8A0-4754-BEF6-F5DF65A47B23}" type="datetimeFigureOut">
               <a:rPr lang="en-US" smtClean="0"/>
-              <a:t>2014-07-31</a:t>
+              <a:t>2014-09-13</a:t>
             </a:fld>
             <a:endParaRPr lang="en-US"/>
           </a:p>
@@ -3270,6 +3104,217 @@
           <a:chExt cx="0" cy="0"/>
         </a:xfrm>
       </p:grpSpPr>
+      <p:sp>
+        <p:nvSpPr>
+          <p:cNvPr id="2" name="Rounded Rectangle 1"/>
+          <p:cNvSpPr/>
+          <p:nvPr/>
+        </p:nvSpPr>
+        <p:spPr>
+          <a:xfrm>
+            <a:off x="228600" y="228600"/>
+            <a:ext cx="8686800" cy="8686800"/>
+          </a:xfrm>
+          <a:prstGeom prst="roundRect">
+            <a:avLst/>
+          </a:prstGeom>
+          <a:solidFill>
+            <a:srgbClr val="92D050"/>
+          </a:solidFill>
+          <a:ln w="381000">
+            <a:solidFill>
+              <a:schemeClr val="bg2">
+                <a:lumMod val="50000"/>
+              </a:schemeClr>
+            </a:solidFill>
+          </a:ln>
+        </p:spPr>
+        <p:style>
+          <a:lnRef idx="2">
+            <a:schemeClr val="accent1">
+              <a:shade val="50000"/>
+            </a:schemeClr>
+          </a:lnRef>
+          <a:fillRef idx="1">
+            <a:schemeClr val="accent1"/>
+          </a:fillRef>
+          <a:effectRef idx="0">
+            <a:schemeClr val="accent1"/>
+          </a:effectRef>
+          <a:fontRef idx="minor">
+            <a:schemeClr val="lt1"/>
+          </a:fontRef>
+        </p:style>
+        <p:txBody>
+          <a:bodyPr rtlCol="0" anchor="ctr"/>
+          <a:lstStyle/>
+          <a:p>
+            <a:pPr algn="ctr"/>
+            <a:endParaRPr lang="en-US" sz="80000" dirty="0">
+              <a:latin typeface="Aharoni" panose="02010803020104030203" pitchFamily="2" charset="-79"/>
+              <a:cs typeface="Aharoni" panose="02010803020104030203" pitchFamily="2" charset="-79"/>
+            </a:endParaRPr>
+          </a:p>
+        </p:txBody>
+      </p:sp>
+      <p:sp>
+        <p:nvSpPr>
+          <p:cNvPr id="3" name="TextBox 2"/>
+          <p:cNvSpPr txBox="1"/>
+          <p:nvPr/>
+        </p:nvSpPr>
+        <p:spPr>
+          <a:xfrm>
+            <a:off x="2673956" y="-334030"/>
+            <a:ext cx="4336444" cy="9325630"/>
+          </a:xfrm>
+          <a:prstGeom prst="rect">
+            <a:avLst/>
+          </a:prstGeom>
+          <a:noFill/>
+        </p:spPr>
+        <p:txBody>
+          <a:bodyPr wrap="none" rtlCol="0">
+            <a:spAutoFit/>
+          </a:bodyPr>
+          <a:lstStyle/>
+          <a:p>
+            <a:r>
+              <a:rPr lang="en-US" sz="60000" dirty="0" smtClean="0">
+                <a:solidFill>
+                  <a:schemeClr val="bg1"/>
+                </a:solidFill>
+                <a:latin typeface="Lucida Handwriting" panose="03010101010101010101" pitchFamily="66" charset="0"/>
+                <a:cs typeface="Aharoni" panose="02010803020104030203" pitchFamily="2" charset="-79"/>
+              </a:rPr>
+              <a:t>J</a:t>
+            </a:r>
+            <a:endParaRPr lang="en-US" sz="60000" dirty="0">
+              <a:solidFill>
+                <a:schemeClr val="bg1"/>
+              </a:solidFill>
+              <a:latin typeface="Lucida Handwriting" panose="03010101010101010101" pitchFamily="66" charset="0"/>
+              <a:cs typeface="Aharoni" panose="02010803020104030203" pitchFamily="2" charset="-79"/>
+            </a:endParaRPr>
+          </a:p>
+        </p:txBody>
+      </p:sp>
+      <p:sp>
+        <p:nvSpPr>
+          <p:cNvPr id="4" name="Rectangle 3"/>
+          <p:cNvSpPr/>
+          <p:nvPr/>
+        </p:nvSpPr>
+        <p:spPr>
+          <a:xfrm>
+            <a:off x="4267200" y="685800"/>
+            <a:ext cx="3733800" cy="1339055"/>
+          </a:xfrm>
+          <a:prstGeom prst="rect">
+            <a:avLst/>
+          </a:prstGeom>
+          <a:solidFill>
+            <a:srgbClr val="92D050"/>
+          </a:solidFill>
+          <a:ln>
+            <a:noFill/>
+          </a:ln>
+        </p:spPr>
+        <p:style>
+          <a:lnRef idx="2">
+            <a:schemeClr val="accent1">
+              <a:shade val="50000"/>
+            </a:schemeClr>
+          </a:lnRef>
+          <a:fillRef idx="1">
+            <a:schemeClr val="accent1"/>
+          </a:fillRef>
+          <a:effectRef idx="0">
+            <a:schemeClr val="accent1"/>
+          </a:effectRef>
+          <a:fontRef idx="minor">
+            <a:schemeClr val="lt1"/>
+          </a:fontRef>
+        </p:style>
+        <p:txBody>
+          <a:bodyPr rtlCol="0" anchor="ctr"/>
+          <a:lstStyle/>
+          <a:p>
+            <a:pPr algn="ctr"/>
+            <a:endParaRPr lang="en-US"/>
+          </a:p>
+        </p:txBody>
+      </p:sp>
+      <p:cxnSp>
+        <p:nvCxnSpPr>
+          <p:cNvPr id="6" name="Straight Connector 5"/>
+          <p:cNvCxnSpPr/>
+          <p:nvPr/>
+        </p:nvCxnSpPr>
+        <p:spPr>
+          <a:xfrm rot="480000" flipV="1">
+            <a:off x="4387710" y="1214720"/>
+            <a:ext cx="1828800" cy="1828800"/>
+          </a:xfrm>
+          <a:prstGeom prst="line">
+            <a:avLst/>
+          </a:prstGeom>
+          <a:ln w="698500">
+            <a:solidFill>
+              <a:schemeClr val="bg1"/>
+            </a:solidFill>
+          </a:ln>
+        </p:spPr>
+        <p:style>
+          <a:lnRef idx="1">
+            <a:schemeClr val="accent1"/>
+          </a:lnRef>
+          <a:fillRef idx="0">
+            <a:schemeClr val="accent1"/>
+          </a:fillRef>
+          <a:effectRef idx="0">
+            <a:schemeClr val="accent1"/>
+          </a:effectRef>
+          <a:fontRef idx="minor">
+            <a:schemeClr val="tx1"/>
+          </a:fontRef>
+        </p:style>
+      </p:cxnSp>
+      <p:cxnSp>
+        <p:nvCxnSpPr>
+          <p:cNvPr id="7" name="Straight Connector 6"/>
+          <p:cNvCxnSpPr/>
+          <p:nvPr/>
+        </p:nvCxnSpPr>
+        <p:spPr>
+          <a:xfrm rot="480000" flipH="1" flipV="1">
+            <a:off x="5711146" y="1405638"/>
+            <a:ext cx="1828800" cy="1828800"/>
+          </a:xfrm>
+          <a:prstGeom prst="line">
+            <a:avLst/>
+          </a:prstGeom>
+          <a:ln w="698500">
+            <a:solidFill>
+              <a:schemeClr val="bg1"/>
+            </a:solidFill>
+          </a:ln>
+        </p:spPr>
+        <p:style>
+          <a:lnRef idx="1">
+            <a:schemeClr val="accent1"/>
+          </a:lnRef>
+          <a:fillRef idx="0">
+            <a:schemeClr val="accent1"/>
+          </a:fillRef>
+          <a:effectRef idx="0">
+            <a:schemeClr val="accent1"/>
+          </a:effectRef>
+          <a:fontRef idx="minor">
+            <a:schemeClr val="tx1"/>
+          </a:fontRef>
+        </p:style>
+      </p:cxnSp>
     </p:spTree>
     <p:extLst>
       <p:ext uri="{BB962C8B-B14F-4D97-AF65-F5344CB8AC3E}">
@@ -3309,85 +3354,28 @@
       </p:grpSpPr>
       <p:sp>
         <p:nvSpPr>
-          <p:cNvPr id="18" name="Freeform 17"/>
+          <p:cNvPr id="2" name="Rounded Rectangle 1"/>
           <p:cNvSpPr/>
           <p:nvPr/>
         </p:nvSpPr>
         <p:spPr>
           <a:xfrm>
-            <a:off x="1214650" y="1265820"/>
-            <a:ext cx="6481549" cy="6417871"/>
+            <a:off x="228600" y="228600"/>
+            <a:ext cx="8686800" cy="8686800"/>
           </a:xfrm>
-          <a:custGeom>
+          <a:prstGeom prst="roundRect">
             <a:avLst/>
-            <a:gdLst>
-              <a:gd name="connsiteX0" fmla="*/ 0 w 6264322"/>
-              <a:gd name="connsiteY0" fmla="*/ 4053385 h 5677469"/>
-              <a:gd name="connsiteX1" fmla="*/ 1856095 w 6264322"/>
-              <a:gd name="connsiteY1" fmla="*/ 5677469 h 5677469"/>
-              <a:gd name="connsiteX2" fmla="*/ 6264322 w 6264322"/>
-              <a:gd name="connsiteY2" fmla="*/ 40943 h 5677469"/>
-              <a:gd name="connsiteX3" fmla="*/ 6264322 w 6264322"/>
-              <a:gd name="connsiteY3" fmla="*/ 0 h 5677469"/>
-              <a:gd name="connsiteX0" fmla="*/ 0 w 6264322"/>
-              <a:gd name="connsiteY0" fmla="*/ 4012442 h 5636526"/>
-              <a:gd name="connsiteX1" fmla="*/ 1856095 w 6264322"/>
-              <a:gd name="connsiteY1" fmla="*/ 5636526 h 5636526"/>
-              <a:gd name="connsiteX2" fmla="*/ 6264322 w 6264322"/>
-              <a:gd name="connsiteY2" fmla="*/ 0 h 5636526"/>
-            </a:gdLst>
-            <a:ahLst/>
-            <a:cxnLst>
-              <a:cxn ang="0">
-                <a:pos x="connsiteX0" y="connsiteY0"/>
-              </a:cxn>
-              <a:cxn ang="0">
-                <a:pos x="connsiteX1" y="connsiteY1"/>
-              </a:cxn>
-              <a:cxn ang="0">
-                <a:pos x="connsiteX2" y="connsiteY2"/>
-              </a:cxn>
-            </a:cxnLst>
-            <a:rect l="l" t="t" r="r" b="b"/>
-            <a:pathLst>
-              <a:path w="6264322" h="5636526">
-                <a:moveTo>
-                  <a:pt x="0" y="4012442"/>
-                </a:moveTo>
-                <a:lnTo>
-                  <a:pt x="1856095" y="5636526"/>
-                </a:lnTo>
-                <a:lnTo>
-                  <a:pt x="6264322" y="0"/>
-                </a:lnTo>
-              </a:path>
-            </a:pathLst>
-          </a:custGeom>
-          <a:noFill/>
-          <a:ln w="1270000" cap="rnd">
-            <a:gradFill>
-              <a:gsLst>
-                <a:gs pos="0">
-                  <a:srgbClr val="00B050"/>
-                </a:gs>
-                <a:gs pos="50000">
-                  <a:srgbClr val="00B050"/>
-                </a:gs>
-                <a:gs pos="100000">
-                  <a:srgbClr val="00D25F"/>
-                </a:gs>
-              </a:gsLst>
-              <a:lin ang="5400000" scaled="0"/>
-            </a:gradFill>
+          </a:prstGeom>
+          <a:solidFill>
+            <a:srgbClr val="568424"/>
+          </a:solidFill>
+          <a:ln w="381000">
+            <a:solidFill>
+              <a:schemeClr val="bg2">
+                <a:lumMod val="50000"/>
+              </a:schemeClr>
+            </a:solidFill>
           </a:ln>
-          <a:effectLst>
-            <a:glow rad="1536700">
-              <a:schemeClr val="bg1">
-                <a:lumMod val="95000"/>
-              </a:schemeClr>
-            </a:glow>
-            <a:softEdge rad="0"/>
-          </a:effectLst>
         </p:spPr>
         <p:style>
           <a:lnRef idx="2">
@@ -3410,14 +3398,200 @@
           <a:lstStyle/>
           <a:p>
             <a:pPr algn="ctr"/>
-            <a:endParaRPr lang="en-US"/>
-          </a:p>
-        </p:txBody>
-      </p:sp>
+            <a:endParaRPr lang="en-US" sz="80000" dirty="0">
+              <a:latin typeface="Aharoni" panose="02010803020104030203" pitchFamily="2" charset="-79"/>
+              <a:cs typeface="Aharoni" panose="02010803020104030203" pitchFamily="2" charset="-79"/>
+            </a:endParaRPr>
+          </a:p>
+        </p:txBody>
+      </p:sp>
+      <p:grpSp>
+        <p:nvGrpSpPr>
+          <p:cNvPr id="3" name="Group 2"/>
+          <p:cNvGrpSpPr/>
+          <p:nvPr/>
+        </p:nvGrpSpPr>
+        <p:grpSpPr>
+          <a:xfrm rot="829928">
+            <a:off x="2058850" y="1214720"/>
+            <a:ext cx="5884235" cy="6092481"/>
+            <a:chOff x="2058850" y="1214720"/>
+            <a:chExt cx="5884235" cy="6092481"/>
+          </a:xfrm>
+        </p:grpSpPr>
+        <p:grpSp>
+          <p:nvGrpSpPr>
+            <p:cNvPr id="23" name="Group 22"/>
+            <p:cNvGrpSpPr/>
+            <p:nvPr/>
+          </p:nvGrpSpPr>
+          <p:grpSpPr>
+            <a:xfrm rot="927732">
+              <a:off x="4790849" y="1214720"/>
+              <a:ext cx="3152236" cy="2019718"/>
+              <a:chOff x="4387710" y="1214720"/>
+              <a:chExt cx="3152236" cy="2019718"/>
+            </a:xfrm>
+          </p:grpSpPr>
+          <p:cxnSp>
+            <p:nvCxnSpPr>
+              <p:cNvPr id="6" name="Straight Connector 5"/>
+              <p:cNvCxnSpPr/>
+              <p:nvPr/>
+            </p:nvCxnSpPr>
+            <p:spPr>
+              <a:xfrm rot="480000" flipV="1">
+                <a:off x="4387710" y="1214720"/>
+                <a:ext cx="1828800" cy="1828800"/>
+              </a:xfrm>
+              <a:prstGeom prst="line">
+                <a:avLst/>
+              </a:prstGeom>
+              <a:ln w="698500">
+                <a:solidFill>
+                  <a:srgbClr val="C0C0C0"/>
+                </a:solidFill>
+              </a:ln>
+            </p:spPr>
+            <p:style>
+              <a:lnRef idx="1">
+                <a:schemeClr val="accent1"/>
+              </a:lnRef>
+              <a:fillRef idx="0">
+                <a:schemeClr val="accent1"/>
+              </a:fillRef>
+              <a:effectRef idx="0">
+                <a:schemeClr val="accent1"/>
+              </a:effectRef>
+              <a:fontRef idx="minor">
+                <a:schemeClr val="tx1"/>
+              </a:fontRef>
+            </p:style>
+          </p:cxnSp>
+          <p:cxnSp>
+            <p:nvCxnSpPr>
+              <p:cNvPr id="7" name="Straight Connector 6"/>
+              <p:cNvCxnSpPr/>
+              <p:nvPr/>
+            </p:nvCxnSpPr>
+            <p:spPr>
+              <a:xfrm rot="480000" flipH="1" flipV="1">
+                <a:off x="5711146" y="1405638"/>
+                <a:ext cx="1828800" cy="1828800"/>
+              </a:xfrm>
+              <a:prstGeom prst="line">
+                <a:avLst/>
+              </a:prstGeom>
+              <a:ln w="698500">
+                <a:solidFill>
+                  <a:srgbClr val="C0C0C0"/>
+                </a:solidFill>
+              </a:ln>
+            </p:spPr>
+            <p:style>
+              <a:lnRef idx="1">
+                <a:schemeClr val="accent1"/>
+              </a:lnRef>
+              <a:fillRef idx="0">
+                <a:schemeClr val="accent1"/>
+              </a:fillRef>
+              <a:effectRef idx="0">
+                <a:schemeClr val="accent1"/>
+              </a:effectRef>
+              <a:fontRef idx="minor">
+                <a:schemeClr val="tx1"/>
+              </a:fontRef>
+            </p:style>
+          </p:cxnSp>
+        </p:grpSp>
+        <p:sp>
+          <p:nvSpPr>
+            <p:cNvPr id="22" name="Freeform 21"/>
+            <p:cNvSpPr/>
+            <p:nvPr/>
+          </p:nvSpPr>
+          <p:spPr>
+            <a:xfrm rot="575806">
+              <a:off x="2058850" y="1537465"/>
+              <a:ext cx="4011013" cy="5769736"/>
+            </a:xfrm>
+            <a:custGeom>
+              <a:avLst/>
+              <a:gdLst>
+                <a:gd name="connsiteX0" fmla="*/ 3451538 w 3451538"/>
+                <a:gd name="connsiteY0" fmla="*/ 0 h 5769736"/>
+                <a:gd name="connsiteX1" fmla="*/ 1738648 w 3451538"/>
+                <a:gd name="connsiteY1" fmla="*/ 5769736 h 5769736"/>
+                <a:gd name="connsiteX2" fmla="*/ 0 w 3451538"/>
+                <a:gd name="connsiteY2" fmla="*/ 5048519 h 5769736"/>
+                <a:gd name="connsiteX0" fmla="*/ 4011013 w 4011013"/>
+                <a:gd name="connsiteY0" fmla="*/ 0 h 5769736"/>
+                <a:gd name="connsiteX1" fmla="*/ 2298123 w 4011013"/>
+                <a:gd name="connsiteY1" fmla="*/ 5769736 h 5769736"/>
+                <a:gd name="connsiteX2" fmla="*/ 0 w 4011013"/>
+                <a:gd name="connsiteY2" fmla="*/ 4829635 h 5769736"/>
+              </a:gdLst>
+              <a:ahLst/>
+              <a:cxnLst>
+                <a:cxn ang="0">
+                  <a:pos x="connsiteX0" y="connsiteY0"/>
+                </a:cxn>
+                <a:cxn ang="0">
+                  <a:pos x="connsiteX1" y="connsiteY1"/>
+                </a:cxn>
+                <a:cxn ang="0">
+                  <a:pos x="connsiteX2" y="connsiteY2"/>
+                </a:cxn>
+              </a:cxnLst>
+              <a:rect l="l" t="t" r="r" b="b"/>
+              <a:pathLst>
+                <a:path w="4011013" h="5769736">
+                  <a:moveTo>
+                    <a:pt x="4011013" y="0"/>
+                  </a:moveTo>
+                  <a:lnTo>
+                    <a:pt x="2298123" y="5769736"/>
+                  </a:lnTo>
+                  <a:lnTo>
+                    <a:pt x="0" y="4829635"/>
+                  </a:lnTo>
+                </a:path>
+              </a:pathLst>
+            </a:custGeom>
+            <a:ln w="736600">
+              <a:solidFill>
+                <a:srgbClr val="C0C0C0"/>
+              </a:solidFill>
+            </a:ln>
+          </p:spPr>
+          <p:style>
+            <a:lnRef idx="1">
+              <a:schemeClr val="accent1"/>
+            </a:lnRef>
+            <a:fillRef idx="0">
+              <a:schemeClr val="accent1"/>
+            </a:fillRef>
+            <a:effectRef idx="0">
+              <a:schemeClr val="accent1"/>
+            </a:effectRef>
+            <a:fontRef idx="minor">
+              <a:schemeClr val="tx1"/>
+            </a:fontRef>
+          </p:style>
+          <p:txBody>
+            <a:bodyPr rtlCol="0" anchor="ctr"/>
+            <a:lstStyle/>
+            <a:p>
+              <a:pPr algn="ctr"/>
+              <a:endParaRPr lang="en-US"/>
+            </a:p>
+          </p:txBody>
+        </p:sp>
+      </p:grpSp>
     </p:spTree>
     <p:extLst>
       <p:ext uri="{BB962C8B-B14F-4D97-AF65-F5344CB8AC3E}">
-        <p14:creationId xmlns:p14="http://schemas.microsoft.com/office/powerpoint/2010/main" val="332931098"/>
+        <p14:creationId xmlns:p14="http://schemas.microsoft.com/office/powerpoint/2010/main" val="1551966506"/>
       </p:ext>
     </p:extLst>
   </p:cSld>
@@ -3453,14 +3627,67 @@
       </p:grpSpPr>
       <p:sp>
         <p:nvSpPr>
-          <p:cNvPr id="3" name="Rectangle 2"/>
+          <p:cNvPr id="2" name="Rounded Rectangle 1"/>
           <p:cNvSpPr/>
           <p:nvPr/>
         </p:nvSpPr>
         <p:spPr>
           <a:xfrm>
-            <a:off x="2209800" y="-2438400"/>
-            <a:ext cx="5029200" cy="13942278"/>
+            <a:off x="228600" y="228600"/>
+            <a:ext cx="8686800" cy="8686800"/>
+          </a:xfrm>
+          <a:prstGeom prst="roundRect">
+            <a:avLst/>
+          </a:prstGeom>
+          <a:solidFill>
+            <a:srgbClr val="C00000"/>
+          </a:solidFill>
+          <a:ln w="381000">
+            <a:solidFill>
+              <a:schemeClr val="bg2">
+                <a:lumMod val="50000"/>
+              </a:schemeClr>
+            </a:solidFill>
+          </a:ln>
+        </p:spPr>
+        <p:style>
+          <a:lnRef idx="2">
+            <a:schemeClr val="accent1">
+              <a:shade val="50000"/>
+            </a:schemeClr>
+          </a:lnRef>
+          <a:fillRef idx="1">
+            <a:schemeClr val="accent1"/>
+          </a:fillRef>
+          <a:effectRef idx="0">
+            <a:schemeClr val="accent1"/>
+          </a:effectRef>
+          <a:fontRef idx="minor">
+            <a:schemeClr val="lt1"/>
+          </a:fontRef>
+        </p:style>
+        <p:txBody>
+          <a:bodyPr rtlCol="0" anchor="ctr"/>
+          <a:lstStyle/>
+          <a:p>
+            <a:pPr algn="ctr"/>
+            <a:endParaRPr lang="en-US" sz="80000" dirty="0">
+              <a:latin typeface="Aharoni" panose="02010803020104030203" pitchFamily="2" charset="-79"/>
+              <a:cs typeface="Aharoni" panose="02010803020104030203" pitchFamily="2" charset="-79"/>
+            </a:endParaRPr>
+          </a:p>
+        </p:txBody>
+      </p:sp>
+      <p:sp>
+        <p:nvSpPr>
+          <p:cNvPr id="3" name="TextBox 2"/>
+          <p:cNvSpPr txBox="1"/>
+          <p:nvPr/>
+        </p:nvSpPr>
+        <p:spPr>
+          <a:xfrm>
+            <a:off x="1524000" y="1128653"/>
+            <a:ext cx="3643946" cy="7786747"/>
           </a:xfrm>
           <a:prstGeom prst="rect">
             <a:avLst/>
@@ -3468,106 +3695,301 @@
           <a:noFill/>
         </p:spPr>
         <p:txBody>
-          <a:bodyPr wrap="square" lIns="91440" tIns="45720" rIns="91440" bIns="45720">
+          <a:bodyPr wrap="none" rtlCol="0">
             <a:spAutoFit/>
-            <a:scene3d>
-              <a:camera prst="orthographicFront"/>
-              <a:lightRig rig="flat" dir="tl">
-                <a:rot lat="0" lon="0" rev="6600000"/>
-              </a:lightRig>
-            </a:scene3d>
-            <a:sp3d extrusionH="25400" contourW="8890">
-              <a:bevelT w="38100" h="31750"/>
-              <a:contourClr>
-                <a:schemeClr val="accent2">
-                  <a:shade val="75000"/>
-                </a:schemeClr>
-              </a:contourClr>
-            </a:sp3d>
           </a:bodyPr>
           <a:lstStyle/>
           <a:p>
+            <a:r>
+              <a:rPr lang="en-US" sz="50000" dirty="0" smtClean="0">
+                <a:solidFill>
+                  <a:schemeClr val="bg1"/>
+                </a:solidFill>
+                <a:latin typeface="Lucida Handwriting" panose="03010101010101010101" pitchFamily="66" charset="0"/>
+                <a:cs typeface="Aharoni" panose="02010803020104030203" pitchFamily="2" charset="-79"/>
+              </a:rPr>
+              <a:t>J</a:t>
+            </a:r>
+            <a:endParaRPr lang="en-US" sz="50000" dirty="0">
+              <a:solidFill>
+                <a:schemeClr val="bg1"/>
+              </a:solidFill>
+              <a:latin typeface="Lucida Handwriting" panose="03010101010101010101" pitchFamily="66" charset="0"/>
+              <a:cs typeface="Aharoni" panose="02010803020104030203" pitchFamily="2" charset="-79"/>
+            </a:endParaRPr>
+          </a:p>
+        </p:txBody>
+      </p:sp>
+      <p:sp>
+        <p:nvSpPr>
+          <p:cNvPr id="4" name="Rectangle 3"/>
+          <p:cNvSpPr/>
+          <p:nvPr/>
+        </p:nvSpPr>
+        <p:spPr>
+          <a:xfrm>
+            <a:off x="2402448" y="1822827"/>
+            <a:ext cx="3733800" cy="1339055"/>
+          </a:xfrm>
+          <a:prstGeom prst="rect">
+            <a:avLst/>
+          </a:prstGeom>
+          <a:solidFill>
+            <a:srgbClr val="C00000"/>
+          </a:solidFill>
+          <a:ln>
+            <a:noFill/>
+          </a:ln>
+        </p:spPr>
+        <p:style>
+          <a:lnRef idx="2">
+            <a:schemeClr val="accent1">
+              <a:shade val="50000"/>
+            </a:schemeClr>
+          </a:lnRef>
+          <a:fillRef idx="1">
+            <a:schemeClr val="accent1"/>
+          </a:fillRef>
+          <a:effectRef idx="0">
+            <a:schemeClr val="accent1"/>
+          </a:effectRef>
+          <a:fontRef idx="minor">
+            <a:schemeClr val="lt1"/>
+          </a:fontRef>
+        </p:style>
+        <p:txBody>
+          <a:bodyPr rtlCol="0" anchor="ctr"/>
+          <a:lstStyle/>
+          <a:p>
             <a:pPr algn="ctr"/>
-            <a:r>
-              <a:rPr lang="en-US" sz="90000" b="1" cap="none" spc="0" dirty="0" smtClean="0">
-                <a:ln w="11430"/>
-                <a:gradFill>
-                  <a:gsLst>
-                    <a:gs pos="0">
-                      <a:schemeClr val="accent2">
-                        <a:tint val="70000"/>
-                        <a:satMod val="245000"/>
-                      </a:schemeClr>
-                    </a:gs>
-                    <a:gs pos="75000">
-                      <a:schemeClr val="accent2">
-                        <a:tint val="90000"/>
-                        <a:shade val="60000"/>
-                        <a:satMod val="240000"/>
-                      </a:schemeClr>
-                    </a:gs>
-                    <a:gs pos="100000">
-                      <a:schemeClr val="accent2">
-                        <a:tint val="100000"/>
-                        <a:shade val="50000"/>
-                        <a:satMod val="240000"/>
-                      </a:schemeClr>
-                    </a:gs>
-                  </a:gsLst>
-                  <a:lin ang="5400000"/>
-                </a:gradFill>
-                <a:effectLst>
-                  <a:outerShdw blurRad="50800" dist="39000" dir="5460000" algn="tl">
-                    <a:srgbClr val="000000">
-                      <a:alpha val="38000"/>
-                    </a:srgbClr>
-                  </a:outerShdw>
-                </a:effectLst>
-              </a:rPr>
-              <a:t>?</a:t>
-            </a:r>
-            <a:endParaRPr lang="en-US" sz="90000" b="1" cap="none" spc="0" dirty="0">
-              <a:ln w="11430"/>
-              <a:gradFill>
-                <a:gsLst>
-                  <a:gs pos="0">
-                    <a:schemeClr val="accent2">
-                      <a:tint val="70000"/>
-                      <a:satMod val="245000"/>
-                    </a:schemeClr>
-                  </a:gs>
-                  <a:gs pos="75000">
-                    <a:schemeClr val="accent2">
-                      <a:tint val="90000"/>
-                      <a:shade val="60000"/>
-                      <a:satMod val="240000"/>
-                    </a:schemeClr>
-                  </a:gs>
-                  <a:gs pos="100000">
-                    <a:schemeClr val="accent2">
-                      <a:tint val="100000"/>
-                      <a:shade val="50000"/>
-                      <a:satMod val="240000"/>
-                    </a:schemeClr>
-                  </a:gs>
-                </a:gsLst>
-                <a:lin ang="5400000"/>
-              </a:gradFill>
-              <a:effectLst>
-                <a:outerShdw blurRad="50800" dist="39000" dir="5460000" algn="tl">
-                  <a:srgbClr val="000000">
-                    <a:alpha val="38000"/>
-                  </a:srgbClr>
-                </a:outerShdw>
-              </a:effectLst>
-            </a:endParaRPr>
+            <a:endParaRPr lang="en-US"/>
+          </a:p>
+        </p:txBody>
+      </p:sp>
+      <p:grpSp>
+        <p:nvGrpSpPr>
+          <p:cNvPr id="5" name="Group 4"/>
+          <p:cNvGrpSpPr/>
+          <p:nvPr/>
+        </p:nvGrpSpPr>
+        <p:grpSpPr>
+          <a:xfrm rot="8618797">
+            <a:off x="5286236" y="3239737"/>
+            <a:ext cx="3152236" cy="2019718"/>
+            <a:chOff x="4387710" y="1214720"/>
+            <a:chExt cx="3152236" cy="2019718"/>
+          </a:xfrm>
+        </p:grpSpPr>
+        <p:cxnSp>
+          <p:nvCxnSpPr>
+            <p:cNvPr id="6" name="Straight Connector 5"/>
+            <p:cNvCxnSpPr/>
+            <p:nvPr/>
+          </p:nvCxnSpPr>
+          <p:spPr>
+            <a:xfrm rot="480000" flipV="1">
+              <a:off x="4387710" y="1214720"/>
+              <a:ext cx="1828800" cy="1828800"/>
+            </a:xfrm>
+            <a:prstGeom prst="line">
+              <a:avLst/>
+            </a:prstGeom>
+            <a:ln w="698500">
+              <a:solidFill>
+                <a:schemeClr val="bg1"/>
+              </a:solidFill>
+            </a:ln>
+          </p:spPr>
+          <p:style>
+            <a:lnRef idx="1">
+              <a:schemeClr val="accent1"/>
+            </a:lnRef>
+            <a:fillRef idx="0">
+              <a:schemeClr val="accent1"/>
+            </a:fillRef>
+            <a:effectRef idx="0">
+              <a:schemeClr val="accent1"/>
+            </a:effectRef>
+            <a:fontRef idx="minor">
+              <a:schemeClr val="tx1"/>
+            </a:fontRef>
+          </p:style>
+        </p:cxnSp>
+        <p:cxnSp>
+          <p:nvCxnSpPr>
+            <p:cNvPr id="7" name="Straight Connector 6"/>
+            <p:cNvCxnSpPr/>
+            <p:nvPr/>
+          </p:nvCxnSpPr>
+          <p:spPr>
+            <a:xfrm rot="480000" flipH="1" flipV="1">
+              <a:off x="5711146" y="1405638"/>
+              <a:ext cx="1828800" cy="1828800"/>
+            </a:xfrm>
+            <a:prstGeom prst="line">
+              <a:avLst/>
+            </a:prstGeom>
+            <a:ln w="698500">
+              <a:solidFill>
+                <a:schemeClr val="bg1"/>
+              </a:solidFill>
+            </a:ln>
+          </p:spPr>
+          <p:style>
+            <a:lnRef idx="1">
+              <a:schemeClr val="accent1"/>
+            </a:lnRef>
+            <a:fillRef idx="0">
+              <a:schemeClr val="accent1"/>
+            </a:fillRef>
+            <a:effectRef idx="0">
+              <a:schemeClr val="accent1"/>
+            </a:effectRef>
+            <a:fontRef idx="minor">
+              <a:schemeClr val="tx1"/>
+            </a:fontRef>
+          </p:style>
+        </p:cxnSp>
+      </p:grpSp>
+      <p:sp>
+        <p:nvSpPr>
+          <p:cNvPr id="8" name="Freeform 7"/>
+          <p:cNvSpPr/>
+          <p:nvPr/>
+        </p:nvSpPr>
+        <p:spPr>
+          <a:xfrm>
+            <a:off x="4281154" y="2201935"/>
+            <a:ext cx="2794716" cy="2389929"/>
+          </a:xfrm>
+          <a:custGeom>
+            <a:avLst/>
+            <a:gdLst>
+              <a:gd name="connsiteX0" fmla="*/ 0 w 2021983"/>
+              <a:gd name="connsiteY0" fmla="*/ 1236372 h 1365160"/>
+              <a:gd name="connsiteX1" fmla="*/ 257577 w 2021983"/>
+              <a:gd name="connsiteY1" fmla="*/ 0 h 1365160"/>
+              <a:gd name="connsiteX2" fmla="*/ 2021983 w 2021983"/>
+              <a:gd name="connsiteY2" fmla="*/ 1365160 h 1365160"/>
+              <a:gd name="connsiteX0" fmla="*/ 0 w 2021983"/>
+              <a:gd name="connsiteY0" fmla="*/ 1236772 h 1365560"/>
+              <a:gd name="connsiteX1" fmla="*/ 257577 w 2021983"/>
+              <a:gd name="connsiteY1" fmla="*/ 400 h 1365560"/>
+              <a:gd name="connsiteX2" fmla="*/ 2021983 w 2021983"/>
+              <a:gd name="connsiteY2" fmla="*/ 1365560 h 1365560"/>
+              <a:gd name="connsiteX0" fmla="*/ 0 w 2021983"/>
+              <a:gd name="connsiteY0" fmla="*/ 1211028 h 1339816"/>
+              <a:gd name="connsiteX1" fmla="*/ 811368 w 2021983"/>
+              <a:gd name="connsiteY1" fmla="*/ 414 h 1339816"/>
+              <a:gd name="connsiteX2" fmla="*/ 2021983 w 2021983"/>
+              <a:gd name="connsiteY2" fmla="*/ 1339816 h 1339816"/>
+              <a:gd name="connsiteX0" fmla="*/ 0 w 2021983"/>
+              <a:gd name="connsiteY0" fmla="*/ 1211028 h 1339816"/>
+              <a:gd name="connsiteX1" fmla="*/ 811368 w 2021983"/>
+              <a:gd name="connsiteY1" fmla="*/ 414 h 1339816"/>
+              <a:gd name="connsiteX2" fmla="*/ 2021983 w 2021983"/>
+              <a:gd name="connsiteY2" fmla="*/ 1339816 h 1339816"/>
+              <a:gd name="connsiteX0" fmla="*/ 0 w 2021983"/>
+              <a:gd name="connsiteY0" fmla="*/ 1211028 h 1339816"/>
+              <a:gd name="connsiteX1" fmla="*/ 811368 w 2021983"/>
+              <a:gd name="connsiteY1" fmla="*/ 414 h 1339816"/>
+              <a:gd name="connsiteX2" fmla="*/ 2021983 w 2021983"/>
+              <a:gd name="connsiteY2" fmla="*/ 1339816 h 1339816"/>
+              <a:gd name="connsiteX0" fmla="*/ 0 w 2021983"/>
+              <a:gd name="connsiteY0" fmla="*/ 1211028 h 1339816"/>
+              <a:gd name="connsiteX1" fmla="*/ 811368 w 2021983"/>
+              <a:gd name="connsiteY1" fmla="*/ 414 h 1339816"/>
+              <a:gd name="connsiteX2" fmla="*/ 2021983 w 2021983"/>
+              <a:gd name="connsiteY2" fmla="*/ 1339816 h 1339816"/>
+              <a:gd name="connsiteX0" fmla="*/ 0 w 2021983"/>
+              <a:gd name="connsiteY0" fmla="*/ 1005100 h 1133888"/>
+              <a:gd name="connsiteX1" fmla="*/ 927278 w 2021983"/>
+              <a:gd name="connsiteY1" fmla="*/ 548 h 1133888"/>
+              <a:gd name="connsiteX2" fmla="*/ 2021983 w 2021983"/>
+              <a:gd name="connsiteY2" fmla="*/ 1133888 h 1133888"/>
+              <a:gd name="connsiteX0" fmla="*/ 0 w 2021983"/>
+              <a:gd name="connsiteY0" fmla="*/ 1005852 h 1134640"/>
+              <a:gd name="connsiteX1" fmla="*/ 927278 w 2021983"/>
+              <a:gd name="connsiteY1" fmla="*/ 1300 h 1134640"/>
+              <a:gd name="connsiteX2" fmla="*/ 2021983 w 2021983"/>
+              <a:gd name="connsiteY2" fmla="*/ 1134640 h 1134640"/>
+              <a:gd name="connsiteX0" fmla="*/ 0 w 2794716"/>
+              <a:gd name="connsiteY0" fmla="*/ 1062341 h 2401743"/>
+              <a:gd name="connsiteX1" fmla="*/ 927278 w 2794716"/>
+              <a:gd name="connsiteY1" fmla="*/ 57789 h 2401743"/>
+              <a:gd name="connsiteX2" fmla="*/ 2794716 w 2794716"/>
+              <a:gd name="connsiteY2" fmla="*/ 2401743 h 2401743"/>
+              <a:gd name="connsiteX0" fmla="*/ 0 w 2794716"/>
+              <a:gd name="connsiteY0" fmla="*/ 1050527 h 2389929"/>
+              <a:gd name="connsiteX1" fmla="*/ 1159098 w 2794716"/>
+              <a:gd name="connsiteY1" fmla="*/ 58854 h 2389929"/>
+              <a:gd name="connsiteX2" fmla="*/ 2794716 w 2794716"/>
+              <a:gd name="connsiteY2" fmla="*/ 2389929 h 2389929"/>
+            </a:gdLst>
+            <a:ahLst/>
+            <a:cxnLst>
+              <a:cxn ang="0">
+                <a:pos x="connsiteX0" y="connsiteY0"/>
+              </a:cxn>
+              <a:cxn ang="0">
+                <a:pos x="connsiteX1" y="connsiteY1"/>
+              </a:cxn>
+              <a:cxn ang="0">
+                <a:pos x="connsiteX2" y="connsiteY2"/>
+              </a:cxn>
+            </a:cxnLst>
+            <a:rect l="l" t="t" r="r" b="b"/>
+            <a:pathLst>
+              <a:path w="2794716" h="2389929">
+                <a:moveTo>
+                  <a:pt x="0" y="1050527"/>
+                </a:moveTo>
+                <a:cubicBezTo>
+                  <a:pt x="124496" y="264916"/>
+                  <a:pt x="693312" y="-164380"/>
+                  <a:pt x="1159098" y="58854"/>
+                </a:cubicBezTo>
+                <a:cubicBezTo>
+                  <a:pt x="1624884" y="282088"/>
+                  <a:pt x="2386885" y="1857604"/>
+                  <a:pt x="2794716" y="2389929"/>
+                </a:cubicBezTo>
+              </a:path>
+            </a:pathLst>
+          </a:custGeom>
+          <a:ln w="635000">
+            <a:solidFill>
+              <a:schemeClr val="bg1"/>
+            </a:solidFill>
+          </a:ln>
+        </p:spPr>
+        <p:style>
+          <a:lnRef idx="1">
+            <a:schemeClr val="accent1"/>
+          </a:lnRef>
+          <a:fillRef idx="0">
+            <a:schemeClr val="accent1"/>
+          </a:fillRef>
+          <a:effectRef idx="0">
+            <a:schemeClr val="accent1"/>
+          </a:effectRef>
+          <a:fontRef idx="minor">
+            <a:schemeClr val="tx1"/>
+          </a:fontRef>
+        </p:style>
+        <p:txBody>
+          <a:bodyPr rtlCol="0" anchor="ctr"/>
+          <a:lstStyle/>
+          <a:p>
+            <a:pPr algn="ctr"/>
+            <a:endParaRPr lang="en-US" dirty="0"/>
           </a:p>
         </p:txBody>
       </p:sp>
     </p:spTree>
     <p:extLst>
       <p:ext uri="{BB962C8B-B14F-4D97-AF65-F5344CB8AC3E}">
-        <p14:creationId xmlns:p14="http://schemas.microsoft.com/office/powerpoint/2010/main" val="977585593"/>
+        <p14:creationId xmlns:p14="http://schemas.microsoft.com/office/powerpoint/2010/main" val="4209204014"/>
       </p:ext>
     </p:extLst>
   </p:cSld>

</xml_diff>

<commit_message>
Added separate logo for magnet links
</commit_message>
<xml_diff>
--- a/logo.pptx
+++ b/logo.pptx
@@ -6,8 +6,9 @@
   </p:sldMasterIdLst>
   <p:sldIdLst>
     <p:sldId id="256" r:id="rId2"/>
-    <p:sldId id="257" r:id="rId3"/>
-    <p:sldId id="258" r:id="rId4"/>
+    <p:sldId id="259" r:id="rId3"/>
+    <p:sldId id="257" r:id="rId4"/>
+    <p:sldId id="258" r:id="rId5"/>
   </p:sldIdLst>
   <p:sldSz cx="9144000" cy="9144000"/>
   <p:notesSz cx="6858000" cy="9144000"/>
@@ -290,7 +291,7 @@
           <a:p>
             <a:fld id="{062DDCC8-E8A0-4754-BEF6-F5DF65A47B23}" type="datetimeFigureOut">
               <a:rPr lang="en-US" smtClean="0"/>
-              <a:t>2014-09-13</a:t>
+              <a:t>10/17/2014</a:t>
             </a:fld>
             <a:endParaRPr lang="en-US"/>
           </a:p>
@@ -460,7 +461,7 @@
           <a:p>
             <a:fld id="{062DDCC8-E8A0-4754-BEF6-F5DF65A47B23}" type="datetimeFigureOut">
               <a:rPr lang="en-US" smtClean="0"/>
-              <a:t>2014-09-13</a:t>
+              <a:t>10/17/2014</a:t>
             </a:fld>
             <a:endParaRPr lang="en-US"/>
           </a:p>
@@ -640,7 +641,7 @@
           <a:p>
             <a:fld id="{062DDCC8-E8A0-4754-BEF6-F5DF65A47B23}" type="datetimeFigureOut">
               <a:rPr lang="en-US" smtClean="0"/>
-              <a:t>2014-09-13</a:t>
+              <a:t>10/17/2014</a:t>
             </a:fld>
             <a:endParaRPr lang="en-US"/>
           </a:p>
@@ -810,7 +811,7 @@
           <a:p>
             <a:fld id="{062DDCC8-E8A0-4754-BEF6-F5DF65A47B23}" type="datetimeFigureOut">
               <a:rPr lang="en-US" smtClean="0"/>
-              <a:t>2014-09-13</a:t>
+              <a:t>10/17/2014</a:t>
             </a:fld>
             <a:endParaRPr lang="en-US"/>
           </a:p>
@@ -1056,7 +1057,7 @@
           <a:p>
             <a:fld id="{062DDCC8-E8A0-4754-BEF6-F5DF65A47B23}" type="datetimeFigureOut">
               <a:rPr lang="en-US" smtClean="0"/>
-              <a:t>2014-09-13</a:t>
+              <a:t>10/17/2014</a:t>
             </a:fld>
             <a:endParaRPr lang="en-US"/>
           </a:p>
@@ -1344,7 +1345,7 @@
           <a:p>
             <a:fld id="{062DDCC8-E8A0-4754-BEF6-F5DF65A47B23}" type="datetimeFigureOut">
               <a:rPr lang="en-US" smtClean="0"/>
-              <a:t>2014-09-13</a:t>
+              <a:t>10/17/2014</a:t>
             </a:fld>
             <a:endParaRPr lang="en-US"/>
           </a:p>
@@ -1766,7 +1767,7 @@
           <a:p>
             <a:fld id="{062DDCC8-E8A0-4754-BEF6-F5DF65A47B23}" type="datetimeFigureOut">
               <a:rPr lang="en-US" smtClean="0"/>
-              <a:t>2014-09-13</a:t>
+              <a:t>10/17/2014</a:t>
             </a:fld>
             <a:endParaRPr lang="en-US"/>
           </a:p>
@@ -1884,7 +1885,7 @@
           <a:p>
             <a:fld id="{062DDCC8-E8A0-4754-BEF6-F5DF65A47B23}" type="datetimeFigureOut">
               <a:rPr lang="en-US" smtClean="0"/>
-              <a:t>2014-09-13</a:t>
+              <a:t>10/17/2014</a:t>
             </a:fld>
             <a:endParaRPr lang="en-US"/>
           </a:p>
@@ -2244,7 +2245,7 @@
           <a:p>
             <a:fld id="{062DDCC8-E8A0-4754-BEF6-F5DF65A47B23}" type="datetimeFigureOut">
               <a:rPr lang="en-US" smtClean="0"/>
-              <a:t>2014-09-13</a:t>
+              <a:t>10/17/2014</a:t>
             </a:fld>
             <a:endParaRPr lang="en-US"/>
           </a:p>
@@ -2504,7 +2505,7 @@
           <a:p>
             <a:fld id="{062DDCC8-E8A0-4754-BEF6-F5DF65A47B23}" type="datetimeFigureOut">
               <a:rPr lang="en-US" smtClean="0"/>
-              <a:t>2014-09-13</a:t>
+              <a:t>10/17/2014</a:t>
             </a:fld>
             <a:endParaRPr lang="en-US"/>
           </a:p>
@@ -2729,7 +2730,7 @@
           <a:p>
             <a:fld id="{062DDCC8-E8A0-4754-BEF6-F5DF65A47B23}" type="datetimeFigureOut">
               <a:rPr lang="en-US" smtClean="0"/>
-              <a:t>2014-09-13</a:t>
+              <a:t>10/17/2014</a:t>
             </a:fld>
             <a:endParaRPr lang="en-US"/>
           </a:p>
@@ -3367,6 +3368,308 @@
             <a:avLst/>
           </a:prstGeom>
           <a:solidFill>
+            <a:srgbClr val="92D050"/>
+          </a:solidFill>
+          <a:ln w="381000">
+            <a:solidFill>
+              <a:schemeClr val="bg2">
+                <a:lumMod val="50000"/>
+              </a:schemeClr>
+            </a:solidFill>
+          </a:ln>
+        </p:spPr>
+        <p:style>
+          <a:lnRef idx="2">
+            <a:schemeClr val="accent1">
+              <a:shade val="50000"/>
+            </a:schemeClr>
+          </a:lnRef>
+          <a:fillRef idx="1">
+            <a:schemeClr val="accent1"/>
+          </a:fillRef>
+          <a:effectRef idx="0">
+            <a:schemeClr val="accent1"/>
+          </a:effectRef>
+          <a:fontRef idx="minor">
+            <a:schemeClr val="lt1"/>
+          </a:fontRef>
+        </p:style>
+        <p:txBody>
+          <a:bodyPr rtlCol="0" anchor="ctr"/>
+          <a:lstStyle/>
+          <a:p>
+            <a:pPr algn="ctr"/>
+            <a:endParaRPr lang="en-US" sz="80000" dirty="0">
+              <a:latin typeface="Aharoni" panose="02010803020104030203" pitchFamily="2" charset="-79"/>
+              <a:cs typeface="Aharoni" panose="02010803020104030203" pitchFamily="2" charset="-79"/>
+            </a:endParaRPr>
+          </a:p>
+        </p:txBody>
+      </p:sp>
+      <p:sp>
+        <p:nvSpPr>
+          <p:cNvPr id="4" name="Rectangle 3"/>
+          <p:cNvSpPr/>
+          <p:nvPr/>
+        </p:nvSpPr>
+        <p:spPr>
+          <a:xfrm>
+            <a:off x="4267200" y="685800"/>
+            <a:ext cx="3733800" cy="1339055"/>
+          </a:xfrm>
+          <a:prstGeom prst="rect">
+            <a:avLst/>
+          </a:prstGeom>
+          <a:solidFill>
+            <a:srgbClr val="92D050"/>
+          </a:solidFill>
+          <a:ln>
+            <a:noFill/>
+          </a:ln>
+        </p:spPr>
+        <p:style>
+          <a:lnRef idx="2">
+            <a:schemeClr val="accent1">
+              <a:shade val="50000"/>
+            </a:schemeClr>
+          </a:lnRef>
+          <a:fillRef idx="1">
+            <a:schemeClr val="accent1"/>
+          </a:fillRef>
+          <a:effectRef idx="0">
+            <a:schemeClr val="accent1"/>
+          </a:effectRef>
+          <a:fontRef idx="minor">
+            <a:schemeClr val="lt1"/>
+          </a:fontRef>
+        </p:style>
+        <p:txBody>
+          <a:bodyPr rtlCol="0" anchor="ctr"/>
+          <a:lstStyle/>
+          <a:p>
+            <a:pPr algn="ctr"/>
+            <a:endParaRPr lang="en-US"/>
+          </a:p>
+        </p:txBody>
+      </p:sp>
+      <p:grpSp>
+        <p:nvGrpSpPr>
+          <p:cNvPr id="5" name="Group 4"/>
+          <p:cNvGrpSpPr/>
+          <p:nvPr/>
+        </p:nvGrpSpPr>
+        <p:grpSpPr>
+          <a:xfrm rot="21182396">
+            <a:off x="5091894" y="1378133"/>
+            <a:ext cx="3152236" cy="2019718"/>
+            <a:chOff x="4387710" y="1214720"/>
+            <a:chExt cx="3152236" cy="2019718"/>
+          </a:xfrm>
+        </p:grpSpPr>
+        <p:cxnSp>
+          <p:nvCxnSpPr>
+            <p:cNvPr id="6" name="Straight Connector 5"/>
+            <p:cNvCxnSpPr/>
+            <p:nvPr/>
+          </p:nvCxnSpPr>
+          <p:spPr>
+            <a:xfrm rot="480000" flipV="1">
+              <a:off x="4387710" y="1214720"/>
+              <a:ext cx="1828800" cy="1828800"/>
+            </a:xfrm>
+            <a:prstGeom prst="line">
+              <a:avLst/>
+            </a:prstGeom>
+            <a:ln w="698500">
+              <a:solidFill>
+                <a:schemeClr val="bg1"/>
+              </a:solidFill>
+            </a:ln>
+          </p:spPr>
+          <p:style>
+            <a:lnRef idx="1">
+              <a:schemeClr val="accent1"/>
+            </a:lnRef>
+            <a:fillRef idx="0">
+              <a:schemeClr val="accent1"/>
+            </a:fillRef>
+            <a:effectRef idx="0">
+              <a:schemeClr val="accent1"/>
+            </a:effectRef>
+            <a:fontRef idx="minor">
+              <a:schemeClr val="tx1"/>
+            </a:fontRef>
+          </p:style>
+        </p:cxnSp>
+        <p:cxnSp>
+          <p:nvCxnSpPr>
+            <p:cNvPr id="7" name="Straight Connector 6"/>
+            <p:cNvCxnSpPr/>
+            <p:nvPr/>
+          </p:nvCxnSpPr>
+          <p:spPr>
+            <a:xfrm rot="480000" flipH="1" flipV="1">
+              <a:off x="5711146" y="1405638"/>
+              <a:ext cx="1828800" cy="1828800"/>
+            </a:xfrm>
+            <a:prstGeom prst="line">
+              <a:avLst/>
+            </a:prstGeom>
+            <a:ln w="698500">
+              <a:solidFill>
+                <a:schemeClr val="bg1"/>
+              </a:solidFill>
+            </a:ln>
+          </p:spPr>
+          <p:style>
+            <a:lnRef idx="1">
+              <a:schemeClr val="accent1"/>
+            </a:lnRef>
+            <a:fillRef idx="0">
+              <a:schemeClr val="accent1"/>
+            </a:fillRef>
+            <a:effectRef idx="0">
+              <a:schemeClr val="accent1"/>
+            </a:effectRef>
+            <a:fontRef idx="minor">
+              <a:schemeClr val="tx1"/>
+            </a:fontRef>
+          </p:style>
+        </p:cxnSp>
+      </p:grpSp>
+      <p:sp>
+        <p:nvSpPr>
+          <p:cNvPr id="9" name="Arc 8"/>
+          <p:cNvSpPr/>
+          <p:nvPr/>
+        </p:nvSpPr>
+        <p:spPr>
+          <a:xfrm>
+            <a:off x="2096438" y="3187822"/>
+            <a:ext cx="4572000" cy="4572000"/>
+          </a:xfrm>
+          <a:prstGeom prst="arc">
+            <a:avLst>
+              <a:gd name="adj1" fmla="val 21594749"/>
+              <a:gd name="adj2" fmla="val 10815244"/>
+            </a:avLst>
+          </a:prstGeom>
+          <a:ln w="698500">
+            <a:solidFill>
+              <a:schemeClr val="bg1"/>
+            </a:solidFill>
+          </a:ln>
+        </p:spPr>
+        <p:style>
+          <a:lnRef idx="1">
+            <a:schemeClr val="accent1"/>
+          </a:lnRef>
+          <a:fillRef idx="0">
+            <a:schemeClr val="accent1"/>
+          </a:fillRef>
+          <a:effectRef idx="0">
+            <a:schemeClr val="accent1"/>
+          </a:effectRef>
+          <a:fontRef idx="minor">
+            <a:schemeClr val="tx1"/>
+          </a:fontRef>
+        </p:style>
+        <p:txBody>
+          <a:bodyPr rtlCol="0" anchor="ctr"/>
+          <a:lstStyle/>
+          <a:p>
+            <a:pPr algn="ctr"/>
+            <a:endParaRPr lang="en-US"/>
+          </a:p>
+        </p:txBody>
+      </p:sp>
+      <p:cxnSp>
+        <p:nvCxnSpPr>
+          <p:cNvPr id="11" name="Straight Connector 10"/>
+          <p:cNvCxnSpPr/>
+          <p:nvPr/>
+        </p:nvCxnSpPr>
+        <p:spPr>
+          <a:xfrm flipV="1">
+            <a:off x="6668438" y="2224581"/>
+            <a:ext cx="0" cy="3338019"/>
+          </a:xfrm>
+          <a:prstGeom prst="line">
+            <a:avLst/>
+          </a:prstGeom>
+          <a:ln w="698500">
+            <a:solidFill>
+              <a:schemeClr val="bg1"/>
+            </a:solidFill>
+          </a:ln>
+        </p:spPr>
+        <p:style>
+          <a:lnRef idx="1">
+            <a:schemeClr val="accent1"/>
+          </a:lnRef>
+          <a:fillRef idx="0">
+            <a:schemeClr val="accent1"/>
+          </a:fillRef>
+          <a:effectRef idx="0">
+            <a:schemeClr val="accent1"/>
+          </a:effectRef>
+          <a:fontRef idx="minor">
+            <a:schemeClr val="tx1"/>
+          </a:fontRef>
+        </p:style>
+      </p:cxnSp>
+    </p:spTree>
+    <p:extLst>
+      <p:ext uri="{BB962C8B-B14F-4D97-AF65-F5344CB8AC3E}">
+        <p14:creationId xmlns:p14="http://schemas.microsoft.com/office/powerpoint/2010/main" val="2403079246"/>
+      </p:ext>
+    </p:extLst>
+  </p:cSld>
+  <p:clrMapOvr>
+    <a:masterClrMapping/>
+  </p:clrMapOvr>
+  <p:timing>
+    <p:tnLst>
+      <p:par>
+        <p:cTn id="1" dur="indefinite" restart="never" nodeType="tmRoot"/>
+      </p:par>
+    </p:tnLst>
+  </p:timing>
+</p:sld>
+</file>
+
+<file path=ppt/slides/slide3.xml><?xml version="1.0" encoding="utf-8"?>
+<p:sld xmlns:a="http://schemas.openxmlformats.org/drawingml/2006/main" xmlns:r="http://schemas.openxmlformats.org/officeDocument/2006/relationships" xmlns:p="http://schemas.openxmlformats.org/presentationml/2006/main">
+  <p:cSld>
+    <p:spTree>
+      <p:nvGrpSpPr>
+        <p:cNvPr id="1" name=""/>
+        <p:cNvGrpSpPr/>
+        <p:nvPr/>
+      </p:nvGrpSpPr>
+      <p:grpSpPr>
+        <a:xfrm>
+          <a:off x="0" y="0"/>
+          <a:ext cx="0" cy="0"/>
+          <a:chOff x="0" y="0"/>
+          <a:chExt cx="0" cy="0"/>
+        </a:xfrm>
+      </p:grpSpPr>
+      <p:sp>
+        <p:nvSpPr>
+          <p:cNvPr id="2" name="Rounded Rectangle 1"/>
+          <p:cNvSpPr/>
+          <p:nvPr/>
+        </p:nvSpPr>
+        <p:spPr>
+          <a:xfrm>
+            <a:off x="228600" y="228600"/>
+            <a:ext cx="8686800" cy="8686800"/>
+          </a:xfrm>
+          <a:prstGeom prst="roundRect">
+            <a:avLst/>
+          </a:prstGeom>
+          <a:solidFill>
             <a:srgbClr val="568424"/>
           </a:solidFill>
           <a:ln w="381000">
@@ -3608,7 +3911,7 @@
 </p:sld>
 </file>
 
-<file path=ppt/slides/slide3.xml><?xml version="1.0" encoding="utf-8"?>
+<file path=ppt/slides/slide4.xml><?xml version="1.0" encoding="utf-8"?>
 <p:sld xmlns:a="http://schemas.openxmlformats.org/drawingml/2006/main" xmlns:r="http://schemas.openxmlformats.org/officeDocument/2006/relationships" xmlns:p="http://schemas.openxmlformats.org/presentationml/2006/main">
   <p:cSld>
     <p:spTree>

</xml_diff>

<commit_message>
Update styling and icons
Match newer styling of JSIT
</commit_message>
<xml_diff>
--- a/logo.pptx
+++ b/logo.pptx
@@ -107,6 +107,22 @@
       </a:defRPr>
     </a:lvl9pPr>
   </p:defaultTextStyle>
+  <p:extLst>
+    <p:ext uri="{EFAFB233-063F-42B5-8137-9DF3F51BA10A}">
+      <p15:sldGuideLst xmlns:p15="http://schemas.microsoft.com/office/powerpoint/2012/main">
+        <p15:guide id="1" orient="horz" pos="2880">
+          <p15:clr>
+            <a:srgbClr val="A4A3A4"/>
+          </p15:clr>
+        </p15:guide>
+        <p15:guide id="2" pos="2880">
+          <p15:clr>
+            <a:srgbClr val="A4A3A4"/>
+          </p15:clr>
+        </p15:guide>
+      </p15:sldGuideLst>
+    </p:ext>
+  </p:extLst>
 </p:presentation>
 </file>
 
@@ -148,10 +164,9 @@
           <a:lstStyle/>
           <a:p>
             <a:r>
-              <a:rPr lang="en-US" smtClean="0"/>
+              <a:rPr lang="en-US"/>
               <a:t>Click to edit Master title style</a:t>
             </a:r>
-            <a:endParaRPr lang="en-US"/>
           </a:p>
         </p:txBody>
       </p:sp>
@@ -267,10 +282,9 @@
           </a:lstStyle>
           <a:p>
             <a:r>
-              <a:rPr lang="en-US" smtClean="0"/>
+              <a:rPr lang="en-US"/>
               <a:t>Click to edit Master subtitle style</a:t>
             </a:r>
-            <a:endParaRPr lang="en-US"/>
           </a:p>
         </p:txBody>
       </p:sp>
@@ -291,7 +305,7 @@
           <a:p>
             <a:fld id="{062DDCC8-E8A0-4754-BEF6-F5DF65A47B23}" type="datetimeFigureOut">
               <a:rPr lang="en-US" smtClean="0"/>
-              <a:t>10/17/2014</a:t>
+              <a:t>9/5/2016</a:t>
             </a:fld>
             <a:endParaRPr lang="en-US"/>
           </a:p>
@@ -385,10 +399,9 @@
           <a:lstStyle/>
           <a:p>
             <a:r>
-              <a:rPr lang="en-US" smtClean="0"/>
+              <a:rPr lang="en-US"/>
               <a:t>Click to edit Master title style</a:t>
             </a:r>
-            <a:endParaRPr lang="en-US"/>
           </a:p>
         </p:txBody>
       </p:sp>
@@ -409,38 +422,37 @@
           <a:p>
             <a:pPr lvl="0"/>
             <a:r>
-              <a:rPr lang="en-US" smtClean="0"/>
+              <a:rPr lang="en-US"/>
               <a:t>Click to edit Master text styles</a:t>
             </a:r>
           </a:p>
           <a:p>
             <a:pPr lvl="1"/>
             <a:r>
-              <a:rPr lang="en-US" smtClean="0"/>
+              <a:rPr lang="en-US"/>
               <a:t>Second level</a:t>
             </a:r>
           </a:p>
           <a:p>
             <a:pPr lvl="2"/>
             <a:r>
-              <a:rPr lang="en-US" smtClean="0"/>
+              <a:rPr lang="en-US"/>
               <a:t>Third level</a:t>
             </a:r>
           </a:p>
           <a:p>
             <a:pPr lvl="3"/>
             <a:r>
-              <a:rPr lang="en-US" smtClean="0"/>
+              <a:rPr lang="en-US"/>
               <a:t>Fourth level</a:t>
             </a:r>
           </a:p>
           <a:p>
             <a:pPr lvl="4"/>
             <a:r>
-              <a:rPr lang="en-US" smtClean="0"/>
+              <a:rPr lang="en-US"/>
               <a:t>Fifth level</a:t>
             </a:r>
-            <a:endParaRPr lang="en-US"/>
           </a:p>
         </p:txBody>
       </p:sp>
@@ -461,7 +473,7 @@
           <a:p>
             <a:fld id="{062DDCC8-E8A0-4754-BEF6-F5DF65A47B23}" type="datetimeFigureOut">
               <a:rPr lang="en-US" smtClean="0"/>
-              <a:t>10/17/2014</a:t>
+              <a:t>9/5/2016</a:t>
             </a:fld>
             <a:endParaRPr lang="en-US"/>
           </a:p>
@@ -560,10 +572,9 @@
           <a:lstStyle/>
           <a:p>
             <a:r>
-              <a:rPr lang="en-US" smtClean="0"/>
+              <a:rPr lang="en-US"/>
               <a:t>Click to edit Master title style</a:t>
             </a:r>
-            <a:endParaRPr lang="en-US"/>
           </a:p>
         </p:txBody>
       </p:sp>
@@ -589,38 +600,37 @@
           <a:p>
             <a:pPr lvl="0"/>
             <a:r>
-              <a:rPr lang="en-US" smtClean="0"/>
+              <a:rPr lang="en-US"/>
               <a:t>Click to edit Master text styles</a:t>
             </a:r>
           </a:p>
           <a:p>
             <a:pPr lvl="1"/>
             <a:r>
-              <a:rPr lang="en-US" smtClean="0"/>
+              <a:rPr lang="en-US"/>
               <a:t>Second level</a:t>
             </a:r>
           </a:p>
           <a:p>
             <a:pPr lvl="2"/>
             <a:r>
-              <a:rPr lang="en-US" smtClean="0"/>
+              <a:rPr lang="en-US"/>
               <a:t>Third level</a:t>
             </a:r>
           </a:p>
           <a:p>
             <a:pPr lvl="3"/>
             <a:r>
-              <a:rPr lang="en-US" smtClean="0"/>
+              <a:rPr lang="en-US"/>
               <a:t>Fourth level</a:t>
             </a:r>
           </a:p>
           <a:p>
             <a:pPr lvl="4"/>
             <a:r>
-              <a:rPr lang="en-US" smtClean="0"/>
+              <a:rPr lang="en-US"/>
               <a:t>Fifth level</a:t>
             </a:r>
-            <a:endParaRPr lang="en-US"/>
           </a:p>
         </p:txBody>
       </p:sp>
@@ -641,7 +651,7 @@
           <a:p>
             <a:fld id="{062DDCC8-E8A0-4754-BEF6-F5DF65A47B23}" type="datetimeFigureOut">
               <a:rPr lang="en-US" smtClean="0"/>
-              <a:t>10/17/2014</a:t>
+              <a:t>9/5/2016</a:t>
             </a:fld>
             <a:endParaRPr lang="en-US"/>
           </a:p>
@@ -735,10 +745,9 @@
           <a:lstStyle/>
           <a:p>
             <a:r>
-              <a:rPr lang="en-US" smtClean="0"/>
+              <a:rPr lang="en-US"/>
               <a:t>Click to edit Master title style</a:t>
             </a:r>
-            <a:endParaRPr lang="en-US"/>
           </a:p>
         </p:txBody>
       </p:sp>
@@ -759,38 +768,37 @@
           <a:p>
             <a:pPr lvl="0"/>
             <a:r>
-              <a:rPr lang="en-US" smtClean="0"/>
+              <a:rPr lang="en-US"/>
               <a:t>Click to edit Master text styles</a:t>
             </a:r>
           </a:p>
           <a:p>
             <a:pPr lvl="1"/>
             <a:r>
-              <a:rPr lang="en-US" smtClean="0"/>
+              <a:rPr lang="en-US"/>
               <a:t>Second level</a:t>
             </a:r>
           </a:p>
           <a:p>
             <a:pPr lvl="2"/>
             <a:r>
-              <a:rPr lang="en-US" smtClean="0"/>
+              <a:rPr lang="en-US"/>
               <a:t>Third level</a:t>
             </a:r>
           </a:p>
           <a:p>
             <a:pPr lvl="3"/>
             <a:r>
-              <a:rPr lang="en-US" smtClean="0"/>
+              <a:rPr lang="en-US"/>
               <a:t>Fourth level</a:t>
             </a:r>
           </a:p>
           <a:p>
             <a:pPr lvl="4"/>
             <a:r>
-              <a:rPr lang="en-US" smtClean="0"/>
+              <a:rPr lang="en-US"/>
               <a:t>Fifth level</a:t>
             </a:r>
-            <a:endParaRPr lang="en-US"/>
           </a:p>
         </p:txBody>
       </p:sp>
@@ -811,7 +819,7 @@
           <a:p>
             <a:fld id="{062DDCC8-E8A0-4754-BEF6-F5DF65A47B23}" type="datetimeFigureOut">
               <a:rPr lang="en-US" smtClean="0"/>
-              <a:t>10/17/2014</a:t>
+              <a:t>9/5/2016</a:t>
             </a:fld>
             <a:endParaRPr lang="en-US"/>
           </a:p>
@@ -914,10 +922,9 @@
           </a:lstStyle>
           <a:p>
             <a:r>
-              <a:rPr lang="en-US" smtClean="0"/>
+              <a:rPr lang="en-US"/>
               <a:t>Click to edit Master title style</a:t>
             </a:r>
-            <a:endParaRPr lang="en-US"/>
           </a:p>
         </p:txBody>
       </p:sp>
@@ -1034,7 +1041,7 @@
           <a:p>
             <a:pPr lvl="0"/>
             <a:r>
-              <a:rPr lang="en-US" smtClean="0"/>
+              <a:rPr lang="en-US"/>
               <a:t>Click to edit Master text styles</a:t>
             </a:r>
           </a:p>
@@ -1057,7 +1064,7 @@
           <a:p>
             <a:fld id="{062DDCC8-E8A0-4754-BEF6-F5DF65A47B23}" type="datetimeFigureOut">
               <a:rPr lang="en-US" smtClean="0"/>
-              <a:t>10/17/2014</a:t>
+              <a:t>9/5/2016</a:t>
             </a:fld>
             <a:endParaRPr lang="en-US"/>
           </a:p>
@@ -1151,10 +1158,9 @@
           <a:lstStyle/>
           <a:p>
             <a:r>
-              <a:rPr lang="en-US" smtClean="0"/>
+              <a:rPr lang="en-US"/>
               <a:t>Click to edit Master title style</a:t>
             </a:r>
-            <a:endParaRPr lang="en-US"/>
           </a:p>
         </p:txBody>
       </p:sp>
@@ -1208,38 +1214,37 @@
           <a:p>
             <a:pPr lvl="0"/>
             <a:r>
-              <a:rPr lang="en-US" smtClean="0"/>
+              <a:rPr lang="en-US"/>
               <a:t>Click to edit Master text styles</a:t>
             </a:r>
           </a:p>
           <a:p>
             <a:pPr lvl="1"/>
             <a:r>
-              <a:rPr lang="en-US" smtClean="0"/>
+              <a:rPr lang="en-US"/>
               <a:t>Second level</a:t>
             </a:r>
           </a:p>
           <a:p>
             <a:pPr lvl="2"/>
             <a:r>
-              <a:rPr lang="en-US" smtClean="0"/>
+              <a:rPr lang="en-US"/>
               <a:t>Third level</a:t>
             </a:r>
           </a:p>
           <a:p>
             <a:pPr lvl="3"/>
             <a:r>
-              <a:rPr lang="en-US" smtClean="0"/>
+              <a:rPr lang="en-US"/>
               <a:t>Fourth level</a:t>
             </a:r>
           </a:p>
           <a:p>
             <a:pPr lvl="4"/>
             <a:r>
-              <a:rPr lang="en-US" smtClean="0"/>
+              <a:rPr lang="en-US"/>
               <a:t>Fifth level</a:t>
             </a:r>
-            <a:endParaRPr lang="en-US"/>
           </a:p>
         </p:txBody>
       </p:sp>
@@ -1293,38 +1298,37 @@
           <a:p>
             <a:pPr lvl="0"/>
             <a:r>
-              <a:rPr lang="en-US" smtClean="0"/>
+              <a:rPr lang="en-US"/>
               <a:t>Click to edit Master text styles</a:t>
             </a:r>
           </a:p>
           <a:p>
             <a:pPr lvl="1"/>
             <a:r>
-              <a:rPr lang="en-US" smtClean="0"/>
+              <a:rPr lang="en-US"/>
               <a:t>Second level</a:t>
             </a:r>
           </a:p>
           <a:p>
             <a:pPr lvl="2"/>
             <a:r>
-              <a:rPr lang="en-US" smtClean="0"/>
+              <a:rPr lang="en-US"/>
               <a:t>Third level</a:t>
             </a:r>
           </a:p>
           <a:p>
             <a:pPr lvl="3"/>
             <a:r>
-              <a:rPr lang="en-US" smtClean="0"/>
+              <a:rPr lang="en-US"/>
               <a:t>Fourth level</a:t>
             </a:r>
           </a:p>
           <a:p>
             <a:pPr lvl="4"/>
             <a:r>
-              <a:rPr lang="en-US" smtClean="0"/>
+              <a:rPr lang="en-US"/>
               <a:t>Fifth level</a:t>
             </a:r>
-            <a:endParaRPr lang="en-US"/>
           </a:p>
         </p:txBody>
       </p:sp>
@@ -1345,7 +1349,7 @@
           <a:p>
             <a:fld id="{062DDCC8-E8A0-4754-BEF6-F5DF65A47B23}" type="datetimeFigureOut">
               <a:rPr lang="en-US" smtClean="0"/>
-              <a:t>10/17/2014</a:t>
+              <a:t>9/5/2016</a:t>
             </a:fld>
             <a:endParaRPr lang="en-US"/>
           </a:p>
@@ -1443,10 +1447,9 @@
           </a:lstStyle>
           <a:p>
             <a:r>
-              <a:rPr lang="en-US" smtClean="0"/>
+              <a:rPr lang="en-US"/>
               <a:t>Click to edit Master title style</a:t>
             </a:r>
-            <a:endParaRPr lang="en-US"/>
           </a:p>
         </p:txBody>
       </p:sp>
@@ -1509,7 +1512,7 @@
           <a:p>
             <a:pPr lvl="0"/>
             <a:r>
-              <a:rPr lang="en-US" smtClean="0"/>
+              <a:rPr lang="en-US"/>
               <a:t>Click to edit Master text styles</a:t>
             </a:r>
           </a:p>
@@ -1565,38 +1568,37 @@
           <a:p>
             <a:pPr lvl="0"/>
             <a:r>
-              <a:rPr lang="en-US" smtClean="0"/>
+              <a:rPr lang="en-US"/>
               <a:t>Click to edit Master text styles</a:t>
             </a:r>
           </a:p>
           <a:p>
             <a:pPr lvl="1"/>
             <a:r>
-              <a:rPr lang="en-US" smtClean="0"/>
+              <a:rPr lang="en-US"/>
               <a:t>Second level</a:t>
             </a:r>
           </a:p>
           <a:p>
             <a:pPr lvl="2"/>
             <a:r>
-              <a:rPr lang="en-US" smtClean="0"/>
+              <a:rPr lang="en-US"/>
               <a:t>Third level</a:t>
             </a:r>
           </a:p>
           <a:p>
             <a:pPr lvl="3"/>
             <a:r>
-              <a:rPr lang="en-US" smtClean="0"/>
+              <a:rPr lang="en-US"/>
               <a:t>Fourth level</a:t>
             </a:r>
           </a:p>
           <a:p>
             <a:pPr lvl="4"/>
             <a:r>
-              <a:rPr lang="en-US" smtClean="0"/>
+              <a:rPr lang="en-US"/>
               <a:t>Fifth level</a:t>
             </a:r>
-            <a:endParaRPr lang="en-US"/>
           </a:p>
         </p:txBody>
       </p:sp>
@@ -1659,7 +1661,7 @@
           <a:p>
             <a:pPr lvl="0"/>
             <a:r>
-              <a:rPr lang="en-US" smtClean="0"/>
+              <a:rPr lang="en-US"/>
               <a:t>Click to edit Master text styles</a:t>
             </a:r>
           </a:p>
@@ -1715,38 +1717,37 @@
           <a:p>
             <a:pPr lvl="0"/>
             <a:r>
-              <a:rPr lang="en-US" smtClean="0"/>
+              <a:rPr lang="en-US"/>
               <a:t>Click to edit Master text styles</a:t>
             </a:r>
           </a:p>
           <a:p>
             <a:pPr lvl="1"/>
             <a:r>
-              <a:rPr lang="en-US" smtClean="0"/>
+              <a:rPr lang="en-US"/>
               <a:t>Second level</a:t>
             </a:r>
           </a:p>
           <a:p>
             <a:pPr lvl="2"/>
             <a:r>
-              <a:rPr lang="en-US" smtClean="0"/>
+              <a:rPr lang="en-US"/>
               <a:t>Third level</a:t>
             </a:r>
           </a:p>
           <a:p>
             <a:pPr lvl="3"/>
             <a:r>
-              <a:rPr lang="en-US" smtClean="0"/>
+              <a:rPr lang="en-US"/>
               <a:t>Fourth level</a:t>
             </a:r>
           </a:p>
           <a:p>
             <a:pPr lvl="4"/>
             <a:r>
-              <a:rPr lang="en-US" smtClean="0"/>
+              <a:rPr lang="en-US"/>
               <a:t>Fifth level</a:t>
             </a:r>
-            <a:endParaRPr lang="en-US"/>
           </a:p>
         </p:txBody>
       </p:sp>
@@ -1767,7 +1768,7 @@
           <a:p>
             <a:fld id="{062DDCC8-E8A0-4754-BEF6-F5DF65A47B23}" type="datetimeFigureOut">
               <a:rPr lang="en-US" smtClean="0"/>
-              <a:t>10/17/2014</a:t>
+              <a:t>9/5/2016</a:t>
             </a:fld>
             <a:endParaRPr lang="en-US"/>
           </a:p>
@@ -1861,10 +1862,9 @@
           <a:lstStyle/>
           <a:p>
             <a:r>
-              <a:rPr lang="en-US" smtClean="0"/>
+              <a:rPr lang="en-US"/>
               <a:t>Click to edit Master title style</a:t>
             </a:r>
-            <a:endParaRPr lang="en-US"/>
           </a:p>
         </p:txBody>
       </p:sp>
@@ -1885,7 +1885,7 @@
           <a:p>
             <a:fld id="{062DDCC8-E8A0-4754-BEF6-F5DF65A47B23}" type="datetimeFigureOut">
               <a:rPr lang="en-US" smtClean="0"/>
-              <a:t>10/17/2014</a:t>
+              <a:t>9/5/2016</a:t>
             </a:fld>
             <a:endParaRPr lang="en-US"/>
           </a:p>
@@ -2019,13 +2019,6 @@
   <p:clrMapOvr>
     <a:masterClrMapping/>
   </p:clrMapOvr>
-  <p:timing>
-    <p:tnLst>
-      <p:par>
-        <p:cTn id="1" dur="indefinite" restart="never" nodeType="tmRoot"/>
-      </p:par>
-    </p:tnLst>
-  </p:timing>
 </p:sldLayout>
 </file>
 
@@ -2071,10 +2064,9 @@
           </a:lstStyle>
           <a:p>
             <a:r>
-              <a:rPr lang="en-US" smtClean="0"/>
+              <a:rPr lang="en-US"/>
               <a:t>Click to edit Master title style</a:t>
             </a:r>
-            <a:endParaRPr lang="en-US"/>
           </a:p>
         </p:txBody>
       </p:sp>
@@ -2128,38 +2120,37 @@
           <a:p>
             <a:pPr lvl="0"/>
             <a:r>
-              <a:rPr lang="en-US" smtClean="0"/>
+              <a:rPr lang="en-US"/>
               <a:t>Click to edit Master text styles</a:t>
             </a:r>
           </a:p>
           <a:p>
             <a:pPr lvl="1"/>
             <a:r>
-              <a:rPr lang="en-US" smtClean="0"/>
+              <a:rPr lang="en-US"/>
               <a:t>Second level</a:t>
             </a:r>
           </a:p>
           <a:p>
             <a:pPr lvl="2"/>
             <a:r>
-              <a:rPr lang="en-US" smtClean="0"/>
+              <a:rPr lang="en-US"/>
               <a:t>Third level</a:t>
             </a:r>
           </a:p>
           <a:p>
             <a:pPr lvl="3"/>
             <a:r>
-              <a:rPr lang="en-US" smtClean="0"/>
+              <a:rPr lang="en-US"/>
               <a:t>Fourth level</a:t>
             </a:r>
           </a:p>
           <a:p>
             <a:pPr lvl="4"/>
             <a:r>
-              <a:rPr lang="en-US" smtClean="0"/>
+              <a:rPr lang="en-US"/>
               <a:t>Fifth level</a:t>
             </a:r>
-            <a:endParaRPr lang="en-US"/>
           </a:p>
         </p:txBody>
       </p:sp>
@@ -2222,7 +2213,7 @@
           <a:p>
             <a:pPr lvl="0"/>
             <a:r>
-              <a:rPr lang="en-US" smtClean="0"/>
+              <a:rPr lang="en-US"/>
               <a:t>Click to edit Master text styles</a:t>
             </a:r>
           </a:p>
@@ -2245,7 +2236,7 @@
           <a:p>
             <a:fld id="{062DDCC8-E8A0-4754-BEF6-F5DF65A47B23}" type="datetimeFigureOut">
               <a:rPr lang="en-US" smtClean="0"/>
-              <a:t>10/17/2014</a:t>
+              <a:t>9/5/2016</a:t>
             </a:fld>
             <a:endParaRPr lang="en-US"/>
           </a:p>
@@ -2303,13 +2294,6 @@
   <p:clrMapOvr>
     <a:masterClrMapping/>
   </p:clrMapOvr>
-  <p:timing>
-    <p:tnLst>
-      <p:par>
-        <p:cTn id="1" dur="indefinite" restart="never" nodeType="tmRoot"/>
-      </p:par>
-    </p:tnLst>
-  </p:timing>
 </p:sldLayout>
 </file>
 
@@ -2355,10 +2339,9 @@
           </a:lstStyle>
           <a:p>
             <a:r>
-              <a:rPr lang="en-US" smtClean="0"/>
+              <a:rPr lang="en-US"/>
               <a:t>Click to edit Master title style</a:t>
             </a:r>
-            <a:endParaRPr lang="en-US"/>
           </a:p>
         </p:txBody>
       </p:sp>
@@ -2482,7 +2465,7 @@
           <a:p>
             <a:pPr lvl="0"/>
             <a:r>
-              <a:rPr lang="en-US" smtClean="0"/>
+              <a:rPr lang="en-US"/>
               <a:t>Click to edit Master text styles</a:t>
             </a:r>
           </a:p>
@@ -2505,7 +2488,7 @@
           <a:p>
             <a:fld id="{062DDCC8-E8A0-4754-BEF6-F5DF65A47B23}" type="datetimeFigureOut">
               <a:rPr lang="en-US" smtClean="0"/>
-              <a:t>10/17/2014</a:t>
+              <a:t>9/5/2016</a:t>
             </a:fld>
             <a:endParaRPr lang="en-US"/>
           </a:p>
@@ -2563,13 +2546,6 @@
   <p:clrMapOvr>
     <a:masterClrMapping/>
   </p:clrMapOvr>
-  <p:timing>
-    <p:tnLst>
-      <p:par>
-        <p:cTn id="1" dur="indefinite" restart="never" nodeType="tmRoot"/>
-      </p:par>
-    </p:tnLst>
-  </p:timing>
 </p:sldLayout>
 </file>
 
@@ -2626,10 +2602,9 @@
           <a:lstStyle/>
           <a:p>
             <a:r>
-              <a:rPr lang="en-US" smtClean="0"/>
+              <a:rPr lang="en-US"/>
               <a:t>Click to edit Master title style</a:t>
             </a:r>
-            <a:endParaRPr lang="en-US"/>
           </a:p>
         </p:txBody>
       </p:sp>
@@ -2660,38 +2635,37 @@
           <a:p>
             <a:pPr lvl="0"/>
             <a:r>
-              <a:rPr lang="en-US" smtClean="0"/>
+              <a:rPr lang="en-US"/>
               <a:t>Click to edit Master text styles</a:t>
             </a:r>
           </a:p>
           <a:p>
             <a:pPr lvl="1"/>
             <a:r>
-              <a:rPr lang="en-US" smtClean="0"/>
+              <a:rPr lang="en-US"/>
               <a:t>Second level</a:t>
             </a:r>
           </a:p>
           <a:p>
             <a:pPr lvl="2"/>
             <a:r>
-              <a:rPr lang="en-US" smtClean="0"/>
+              <a:rPr lang="en-US"/>
               <a:t>Third level</a:t>
             </a:r>
           </a:p>
           <a:p>
             <a:pPr lvl="3"/>
             <a:r>
-              <a:rPr lang="en-US" smtClean="0"/>
+              <a:rPr lang="en-US"/>
               <a:t>Fourth level</a:t>
             </a:r>
           </a:p>
           <a:p>
             <a:pPr lvl="4"/>
             <a:r>
-              <a:rPr lang="en-US" smtClean="0"/>
+              <a:rPr lang="en-US"/>
               <a:t>Fifth level</a:t>
             </a:r>
-            <a:endParaRPr lang="en-US"/>
           </a:p>
         </p:txBody>
       </p:sp>
@@ -2730,7 +2704,7 @@
           <a:p>
             <a:fld id="{062DDCC8-E8A0-4754-BEF6-F5DF65A47B23}" type="datetimeFigureOut">
               <a:rPr lang="en-US" smtClean="0"/>
-              <a:t>10/17/2014</a:t>
+              <a:t>9/5/2016</a:t>
             </a:fld>
             <a:endParaRPr lang="en-US"/>
           </a:p>
@@ -3117,17 +3091,18 @@
             <a:ext cx="8686800" cy="8686800"/>
           </a:xfrm>
           <a:prstGeom prst="roundRect">
-            <a:avLst/>
+            <a:avLst>
+              <a:gd name="adj" fmla="val 0"/>
+            </a:avLst>
           </a:prstGeom>
           <a:solidFill>
-            <a:srgbClr val="92D050"/>
+            <a:srgbClr val="6CA5D0"/>
           </a:solidFill>
           <a:ln w="381000">
             <a:solidFill>
-              <a:schemeClr val="bg2">
-                <a:lumMod val="50000"/>
-              </a:schemeClr>
+              <a:srgbClr val="6CA5D0"/>
             </a:solidFill>
+            <a:miter lim="800000"/>
           </a:ln>
         </p:spPr>
         <p:style>
@@ -3181,7 +3156,7 @@
           <a:lstStyle/>
           <a:p>
             <a:r>
-              <a:rPr lang="en-US" sz="60000" dirty="0" smtClean="0">
+              <a:rPr lang="en-US" sz="60000" dirty="0">
                 <a:solidFill>
                   <a:schemeClr val="bg1"/>
                 </a:solidFill>
@@ -3190,13 +3165,6 @@
               </a:rPr>
               <a:t>J</a:t>
             </a:r>
-            <a:endParaRPr lang="en-US" sz="60000" dirty="0">
-              <a:solidFill>
-                <a:schemeClr val="bg1"/>
-              </a:solidFill>
-              <a:latin typeface="Lucida Handwriting" panose="03010101010101010101" pitchFamily="66" charset="0"/>
-              <a:cs typeface="Aharoni" panose="02010803020104030203" pitchFamily="2" charset="-79"/>
-            </a:endParaRPr>
           </a:p>
         </p:txBody>
       </p:sp>
@@ -3215,7 +3183,7 @@
             <a:avLst/>
           </a:prstGeom>
           <a:solidFill>
-            <a:srgbClr val="92D050"/>
+            <a:srgbClr val="6CA5D0"/>
           </a:solidFill>
           <a:ln>
             <a:noFill/>
@@ -3326,13 +3294,6 @@
   <p:clrMapOvr>
     <a:masterClrMapping/>
   </p:clrMapOvr>
-  <p:timing>
-    <p:tnLst>
-      <p:par>
-        <p:cTn id="1" dur="indefinite" restart="never" nodeType="tmRoot"/>
-      </p:par>
-    </p:tnLst>
-  </p:timing>
 </p:sld>
 </file>
 
@@ -3365,17 +3326,18 @@
             <a:ext cx="8686800" cy="8686800"/>
           </a:xfrm>
           <a:prstGeom prst="roundRect">
-            <a:avLst/>
+            <a:avLst>
+              <a:gd name="adj" fmla="val 0"/>
+            </a:avLst>
           </a:prstGeom>
           <a:solidFill>
-            <a:srgbClr val="92D050"/>
+            <a:srgbClr val="6CA5D0"/>
           </a:solidFill>
           <a:ln w="381000">
             <a:solidFill>
-              <a:schemeClr val="bg2">
-                <a:lumMod val="50000"/>
-              </a:schemeClr>
+              <a:srgbClr val="6CA5D0"/>
             </a:solidFill>
+            <a:miter lim="800000"/>
           </a:ln>
         </p:spPr>
         <p:style>
@@ -3421,7 +3383,7 @@
             <a:avLst/>
           </a:prstGeom>
           <a:solidFill>
-            <a:srgbClr val="92D050"/>
+            <a:srgbClr val="6CA5D0"/>
           </a:solidFill>
           <a:ln>
             <a:noFill/>
@@ -3628,13 +3590,6 @@
   <p:clrMapOvr>
     <a:masterClrMapping/>
   </p:clrMapOvr>
-  <p:timing>
-    <p:tnLst>
-      <p:par>
-        <p:cTn id="1" dur="indefinite" restart="never" nodeType="tmRoot"/>
-      </p:par>
-    </p:tnLst>
-  </p:timing>
 </p:sld>
 </file>
 
@@ -3667,17 +3622,18 @@
             <a:ext cx="8686800" cy="8686800"/>
           </a:xfrm>
           <a:prstGeom prst="roundRect">
-            <a:avLst/>
+            <a:avLst>
+              <a:gd name="adj" fmla="val 0"/>
+            </a:avLst>
           </a:prstGeom>
           <a:solidFill>
-            <a:srgbClr val="568424"/>
+            <a:srgbClr val="33709D"/>
           </a:solidFill>
           <a:ln w="381000">
             <a:solidFill>
-              <a:schemeClr val="bg2">
-                <a:lumMod val="50000"/>
-              </a:schemeClr>
+              <a:srgbClr val="33709D"/>
             </a:solidFill>
+            <a:miter lim="800000"/>
           </a:ln>
         </p:spPr>
         <p:style>
@@ -3901,13 +3857,6 @@
   <p:clrMapOvr>
     <a:masterClrMapping/>
   </p:clrMapOvr>
-  <p:timing>
-    <p:tnLst>
-      <p:par>
-        <p:cTn id="1" dur="indefinite" restart="never" nodeType="tmRoot"/>
-      </p:par>
-    </p:tnLst>
-  </p:timing>
 </p:sld>
 </file>
 
@@ -3940,17 +3889,18 @@
             <a:ext cx="8686800" cy="8686800"/>
           </a:xfrm>
           <a:prstGeom prst="roundRect">
-            <a:avLst/>
+            <a:avLst>
+              <a:gd name="adj" fmla="val 0"/>
+            </a:avLst>
           </a:prstGeom>
           <a:solidFill>
             <a:srgbClr val="C00000"/>
           </a:solidFill>
           <a:ln w="381000">
             <a:solidFill>
-              <a:schemeClr val="bg2">
-                <a:lumMod val="50000"/>
-              </a:schemeClr>
+              <a:srgbClr val="C00000"/>
             </a:solidFill>
+            <a:miter lim="800000"/>
           </a:ln>
         </p:spPr>
         <p:style>
@@ -4004,7 +3954,7 @@
           <a:lstStyle/>
           <a:p>
             <a:r>
-              <a:rPr lang="en-US" sz="50000" dirty="0" smtClean="0">
+              <a:rPr lang="en-US" sz="50000" dirty="0">
                 <a:solidFill>
                   <a:schemeClr val="bg1"/>
                 </a:solidFill>
@@ -4013,13 +3963,6 @@
               </a:rPr>
               <a:t>J</a:t>
             </a:r>
-            <a:endParaRPr lang="en-US" sz="50000" dirty="0">
-              <a:solidFill>
-                <a:schemeClr val="bg1"/>
-              </a:solidFill>
-              <a:latin typeface="Lucida Handwriting" panose="03010101010101010101" pitchFamily="66" charset="0"/>
-              <a:cs typeface="Aharoni" panose="02010803020104030203" pitchFamily="2" charset="-79"/>
-            </a:endParaRPr>
           </a:p>
         </p:txBody>
       </p:sp>
@@ -4299,13 +4242,6 @@
   <p:clrMapOvr>
     <a:masterClrMapping/>
   </p:clrMapOvr>
-  <p:timing>
-    <p:tnLst>
-      <p:par>
-        <p:cTn id="1" dur="indefinite" restart="never" nodeType="tmRoot"/>
-      </p:par>
-    </p:tnLst>
-  </p:timing>
 </p:sld>
 </file>
 

</xml_diff>